<commit_message>
Update pptx for ContAdjustments
</commit_message>
<xml_diff>
--- a/src/doc/Simario_overview.pptx
+++ b/src/doc/Simario_overview.pptx
@@ -5,7 +5,7 @@
     <p:sldMasterId id="2147483648" r:id="rId1"/>
   </p:sldMasterIdLst>
   <p:handoutMasterIdLst>
-    <p:handoutMasterId r:id="rId30"/>
+    <p:handoutMasterId r:id="rId31"/>
   </p:handoutMasterIdLst>
   <p:sldIdLst>
     <p:sldId id="256" r:id="rId2"/>
@@ -18,24 +18,25 @@
     <p:sldId id="284" r:id="rId9"/>
     <p:sldId id="274" r:id="rId10"/>
     <p:sldId id="275" r:id="rId11"/>
-    <p:sldId id="277" r:id="rId12"/>
-    <p:sldId id="278" r:id="rId13"/>
-    <p:sldId id="280" r:id="rId14"/>
-    <p:sldId id="281" r:id="rId15"/>
-    <p:sldId id="261" r:id="rId16"/>
-    <p:sldId id="269" r:id="rId17"/>
-    <p:sldId id="264" r:id="rId18"/>
-    <p:sldId id="268" r:id="rId19"/>
-    <p:sldId id="267" r:id="rId20"/>
-    <p:sldId id="266" r:id="rId21"/>
-    <p:sldId id="272" r:id="rId22"/>
-    <p:sldId id="265" r:id="rId23"/>
-    <p:sldId id="257" r:id="rId24"/>
-    <p:sldId id="282" r:id="rId25"/>
-    <p:sldId id="283" r:id="rId26"/>
-    <p:sldId id="287" r:id="rId27"/>
-    <p:sldId id="288" r:id="rId28"/>
-    <p:sldId id="286" r:id="rId29"/>
+    <p:sldId id="290" r:id="rId12"/>
+    <p:sldId id="277" r:id="rId13"/>
+    <p:sldId id="278" r:id="rId14"/>
+    <p:sldId id="280" r:id="rId15"/>
+    <p:sldId id="281" r:id="rId16"/>
+    <p:sldId id="261" r:id="rId17"/>
+    <p:sldId id="269" r:id="rId18"/>
+    <p:sldId id="264" r:id="rId19"/>
+    <p:sldId id="268" r:id="rId20"/>
+    <p:sldId id="267" r:id="rId21"/>
+    <p:sldId id="266" r:id="rId22"/>
+    <p:sldId id="272" r:id="rId23"/>
+    <p:sldId id="265" r:id="rId24"/>
+    <p:sldId id="257" r:id="rId25"/>
+    <p:sldId id="282" r:id="rId26"/>
+    <p:sldId id="283" r:id="rId27"/>
+    <p:sldId id="287" r:id="rId28"/>
+    <p:sldId id="288" r:id="rId29"/>
+    <p:sldId id="286" r:id="rId30"/>
   </p:sldIdLst>
   <p:sldSz cx="9144000" cy="6858000" type="screen4x3"/>
   <p:notesSz cx="6797675" cy="9928225"/>
@@ -6284,7 +6285,7 @@
           <a:p>
             <a:fld id="{FCC0B684-8014-45B5-B9C4-47CA9572B093}" type="datetimeFigureOut">
               <a:rPr lang="en-NZ" smtClean="0"/>
-              <a:t>16/03/2012</a:t>
+              <a:t>14/05/2012</a:t>
             </a:fld>
             <a:endParaRPr lang="en-NZ"/>
           </a:p>
@@ -6548,7 +6549,7 @@
           <a:p>
             <a:fld id="{3ACCE87F-A4BF-4D9A-9320-ACD565033031}" type="datetimeFigureOut">
               <a:rPr lang="en-NZ" smtClean="0"/>
-              <a:t>16/03/2012</a:t>
+              <a:t>14/05/2012</a:t>
             </a:fld>
             <a:endParaRPr lang="en-NZ"/>
           </a:p>
@@ -6713,7 +6714,7 @@
           <a:p>
             <a:fld id="{3ACCE87F-A4BF-4D9A-9320-ACD565033031}" type="datetimeFigureOut">
               <a:rPr lang="en-NZ" smtClean="0"/>
-              <a:t>16/03/2012</a:t>
+              <a:t>14/05/2012</a:t>
             </a:fld>
             <a:endParaRPr lang="en-NZ"/>
           </a:p>
@@ -6888,7 +6889,7 @@
           <a:p>
             <a:fld id="{3ACCE87F-A4BF-4D9A-9320-ACD565033031}" type="datetimeFigureOut">
               <a:rPr lang="en-NZ" smtClean="0"/>
-              <a:t>16/03/2012</a:t>
+              <a:t>14/05/2012</a:t>
             </a:fld>
             <a:endParaRPr lang="en-NZ"/>
           </a:p>
@@ -7053,7 +7054,7 @@
           <a:p>
             <a:fld id="{3ACCE87F-A4BF-4D9A-9320-ACD565033031}" type="datetimeFigureOut">
               <a:rPr lang="en-NZ" smtClean="0"/>
-              <a:t>16/03/2012</a:t>
+              <a:t>14/05/2012</a:t>
             </a:fld>
             <a:endParaRPr lang="en-NZ"/>
           </a:p>
@@ -7294,7 +7295,7 @@
           <a:p>
             <a:fld id="{3ACCE87F-A4BF-4D9A-9320-ACD565033031}" type="datetimeFigureOut">
               <a:rPr lang="en-NZ" smtClean="0"/>
-              <a:t>16/03/2012</a:t>
+              <a:t>14/05/2012</a:t>
             </a:fld>
             <a:endParaRPr lang="en-NZ"/>
           </a:p>
@@ -7577,7 +7578,7 @@
           <a:p>
             <a:fld id="{3ACCE87F-A4BF-4D9A-9320-ACD565033031}" type="datetimeFigureOut">
               <a:rPr lang="en-NZ" smtClean="0"/>
-              <a:t>16/03/2012</a:t>
+              <a:t>14/05/2012</a:t>
             </a:fld>
             <a:endParaRPr lang="en-NZ"/>
           </a:p>
@@ -7994,7 +7995,7 @@
           <a:p>
             <a:fld id="{3ACCE87F-A4BF-4D9A-9320-ACD565033031}" type="datetimeFigureOut">
               <a:rPr lang="en-NZ" smtClean="0"/>
-              <a:t>16/03/2012</a:t>
+              <a:t>14/05/2012</a:t>
             </a:fld>
             <a:endParaRPr lang="en-NZ"/>
           </a:p>
@@ -8107,7 +8108,7 @@
           <a:p>
             <a:fld id="{3ACCE87F-A4BF-4D9A-9320-ACD565033031}" type="datetimeFigureOut">
               <a:rPr lang="en-NZ" smtClean="0"/>
-              <a:t>16/03/2012</a:t>
+              <a:t>14/05/2012</a:t>
             </a:fld>
             <a:endParaRPr lang="en-NZ"/>
           </a:p>
@@ -8197,7 +8198,7 @@
           <a:p>
             <a:fld id="{3ACCE87F-A4BF-4D9A-9320-ACD565033031}" type="datetimeFigureOut">
               <a:rPr lang="en-NZ" smtClean="0"/>
-              <a:t>16/03/2012</a:t>
+              <a:t>14/05/2012</a:t>
             </a:fld>
             <a:endParaRPr lang="en-NZ"/>
           </a:p>
@@ -8469,7 +8470,7 @@
           <a:p>
             <a:fld id="{3ACCE87F-A4BF-4D9A-9320-ACD565033031}" type="datetimeFigureOut">
               <a:rPr lang="en-NZ" smtClean="0"/>
-              <a:t>16/03/2012</a:t>
+              <a:t>14/05/2012</a:t>
             </a:fld>
             <a:endParaRPr lang="en-NZ"/>
           </a:p>
@@ -8717,7 +8718,7 @@
           <a:p>
             <a:fld id="{3ACCE87F-A4BF-4D9A-9320-ACD565033031}" type="datetimeFigureOut">
               <a:rPr lang="en-NZ" smtClean="0"/>
-              <a:t>16/03/2012</a:t>
+              <a:t>14/05/2012</a:t>
             </a:fld>
             <a:endParaRPr lang="en-NZ"/>
           </a:p>
@@ -8925,7 +8926,7 @@
           <a:p>
             <a:fld id="{3ACCE87F-A4BF-4D9A-9320-ACD565033031}" type="datetimeFigureOut">
               <a:rPr lang="en-NZ" smtClean="0"/>
-              <a:t>16/03/2012</a:t>
+              <a:t>14/05/2012</a:t>
             </a:fld>
             <a:endParaRPr lang="en-NZ"/>
           </a:p>
@@ -9335,15 +9336,7 @@
           <a:p>
             <a:r>
               <a:rPr lang="en-NZ" dirty="0" smtClean="0"/>
-              <a:t>A </a:t>
-            </a:r>
-            <a:r>
-              <a:rPr lang="en-NZ" dirty="0" smtClean="0"/>
-              <a:t>discrete-time dynamic </a:t>
-            </a:r>
-            <a:r>
-              <a:rPr lang="en-NZ" dirty="0" smtClean="0"/>
-              <a:t>micro-simulation framework for R</a:t>
+              <a:t>A discrete-time dynamic micro-simulation framework for R</a:t>
             </a:r>
             <a:endParaRPr lang="en-NZ" dirty="0"/>
           </a:p>
@@ -9530,7 +9523,7 @@
           <a:p>
             <a:r>
               <a:rPr lang="en-NZ" dirty="0" smtClean="0"/>
-              <a:t>Propensity arrays</a:t>
+              <a:t>Continuous adjustments	</a:t>
             </a:r>
             <a:endParaRPr lang="en-NZ" dirty="0"/>
           </a:p>
@@ -9546,58 +9539,565 @@
             <p:ph idx="1"/>
           </p:nvPr>
         </p:nvSpPr>
-        <p:spPr/>
+        <p:spPr>
+          <a:xfrm>
+            <a:off x="457200" y="1279301"/>
+            <a:ext cx="8507288" cy="4525963"/>
+          </a:xfrm>
+        </p:spPr>
         <p:txBody>
-          <a:bodyPr/>
+          <a:bodyPr>
+            <a:normAutofit/>
+          </a:bodyPr>
           <a:lstStyle/>
           <a:p>
             <a:r>
               <a:rPr lang="en-NZ" dirty="0" smtClean="0"/>
-              <a:t>consist </a:t>
-            </a:r>
-            <a:r>
-              <a:rPr lang="en-NZ" dirty="0"/>
-              <a:t>of:</a:t>
+              <a:t>The user may wish to specify values desired for a continuous </a:t>
+            </a:r>
+            <a:r>
+              <a:rPr lang="en-NZ" dirty="0" err="1" smtClean="0"/>
+              <a:t>simframe</a:t>
+            </a:r>
+            <a:r>
+              <a:rPr lang="en-NZ" dirty="0" smtClean="0"/>
+              <a:t> variable – pre-simulation and/or for specific iterations</a:t>
             </a:r>
           </a:p>
           <a:p>
             <a:pPr lvl="1"/>
             <a:r>
-              <a:rPr lang="en-NZ" dirty="0"/>
-              <a:t>rows - the individual micro-units</a:t>
-            </a:r>
-          </a:p>
-          <a:p>
-            <a:pPr lvl="1"/>
-            <a:r>
-              <a:rPr lang="en-NZ" dirty="0"/>
-              <a:t>cols - categories, with one less column than </a:t>
+              <a:rPr lang="en-NZ" dirty="0" err="1" smtClean="0"/>
+              <a:t>Eg</a:t>
             </a:r>
             <a:r>
               <a:rPr lang="en-NZ" dirty="0" smtClean="0"/>
-              <a:t>the total </a:t>
-            </a:r>
-            <a:r>
-              <a:rPr lang="en-NZ" dirty="0"/>
-              <a:t>number of categories</a:t>
-            </a:r>
-          </a:p>
-          <a:p>
-            <a:pPr lvl="1"/>
-            <a:r>
-              <a:rPr lang="en-NZ" dirty="0"/>
-              <a:t>z dim - iterations/years</a:t>
-            </a:r>
-          </a:p>
-          <a:p>
-            <a:endParaRPr lang="en-NZ" dirty="0"/>
+              <a:t>: fixed simulation values for mother’s hours worked may be specified for micro-units</a:t>
+            </a:r>
+          </a:p>
+          <a:p>
+            <a:r>
+              <a:rPr lang="en-NZ" sz="2800" dirty="0" smtClean="0"/>
+              <a:t>Desired final values can be specified in a continuous adjustment </a:t>
+            </a:r>
+            <a:r>
+              <a:rPr lang="en-NZ" sz="2800" dirty="0"/>
+              <a:t>matrix; </a:t>
+            </a:r>
+            <a:r>
+              <a:rPr lang="en-NZ" sz="2800" dirty="0" smtClean="0"/>
+              <a:t>NA </a:t>
+            </a:r>
+            <a:r>
+              <a:rPr lang="en-NZ" sz="2800" dirty="0"/>
+              <a:t>will leave the </a:t>
+            </a:r>
+            <a:r>
+              <a:rPr lang="en-NZ" sz="2800" dirty="0" smtClean="0"/>
+              <a:t>value unchanged</a:t>
+            </a:r>
+            <a:endParaRPr lang="en-NZ" sz="3600" dirty="0"/>
           </a:p>
         </p:txBody>
       </p:sp>
+      <p:graphicFrame>
+        <p:nvGraphicFramePr>
+          <p:cNvPr id="4" name="Table 3"/>
+          <p:cNvGraphicFramePr>
+            <a:graphicFrameLocks noGrp="1"/>
+          </p:cNvGraphicFramePr>
+          <p:nvPr>
+            <p:extLst>
+              <p:ext uri="{D42A27DB-BD31-4B8C-83A1-F6EECF244321}">
+                <p14:modId xmlns:p14="http://schemas.microsoft.com/office/powerpoint/2010/main" val="792247883"/>
+              </p:ext>
+            </p:extLst>
+          </p:nvPr>
+        </p:nvGraphicFramePr>
+        <p:xfrm>
+          <a:off x="1331640" y="4887168"/>
+          <a:ext cx="6096000" cy="1854200"/>
+        </p:xfrm>
+        <a:graphic>
+          <a:graphicData uri="http://schemas.openxmlformats.org/drawingml/2006/table">
+            <a:tbl>
+              <a:tblPr firstRow="1" bandRow="1">
+                <a:tableStyleId>{5C22544A-7EE6-4342-B048-85BDC9FD1C3A}</a:tableStyleId>
+              </a:tblPr>
+              <a:tblGrid>
+                <a:gridCol w="1016000"/>
+                <a:gridCol w="1016000"/>
+                <a:gridCol w="1016000"/>
+                <a:gridCol w="1016000"/>
+                <a:gridCol w="1016000"/>
+                <a:gridCol w="1016000"/>
+              </a:tblGrid>
+              <a:tr h="370840">
+                <a:tc>
+                  <a:txBody>
+                    <a:bodyPr/>
+                    <a:lstStyle/>
+                    <a:p>
+                      <a:endParaRPr lang="en-NZ" dirty="0"/>
+                    </a:p>
+                  </a:txBody>
+                  <a:tcPr/>
+                </a:tc>
+                <a:tc>
+                  <a:txBody>
+                    <a:bodyPr/>
+                    <a:lstStyle/>
+                    <a:p>
+                      <a:r>
+                        <a:rPr lang="en-NZ" dirty="0" err="1" smtClean="0"/>
+                        <a:t>Presim</a:t>
+                      </a:r>
+                      <a:endParaRPr lang="en-NZ" dirty="0"/>
+                    </a:p>
+                  </a:txBody>
+                  <a:tcPr/>
+                </a:tc>
+                <a:tc>
+                  <a:txBody>
+                    <a:bodyPr/>
+                    <a:lstStyle/>
+                    <a:p>
+                      <a:r>
+                        <a:rPr lang="en-NZ" dirty="0" err="1" smtClean="0"/>
+                        <a:t>Iter</a:t>
+                      </a:r>
+                      <a:r>
+                        <a:rPr lang="en-NZ" dirty="0" smtClean="0"/>
+                        <a:t>. 1</a:t>
+                      </a:r>
+                      <a:endParaRPr lang="en-NZ" dirty="0"/>
+                    </a:p>
+                  </a:txBody>
+                  <a:tcPr/>
+                </a:tc>
+                <a:tc>
+                  <a:txBody>
+                    <a:bodyPr/>
+                    <a:lstStyle/>
+                    <a:p>
+                      <a:r>
+                        <a:rPr lang="en-NZ" dirty="0" err="1" smtClean="0"/>
+                        <a:t>Iter</a:t>
+                      </a:r>
+                      <a:r>
+                        <a:rPr lang="en-NZ" dirty="0" smtClean="0"/>
+                        <a:t>. 2</a:t>
+                      </a:r>
+                      <a:endParaRPr lang="en-NZ" dirty="0"/>
+                    </a:p>
+                  </a:txBody>
+                  <a:tcPr/>
+                </a:tc>
+                <a:tc>
+                  <a:txBody>
+                    <a:bodyPr/>
+                    <a:lstStyle/>
+                    <a:p>
+                      <a:r>
+                        <a:rPr lang="en-NZ" dirty="0" smtClean="0"/>
+                        <a:t>…</a:t>
+                      </a:r>
+                      <a:endParaRPr lang="en-NZ" dirty="0"/>
+                    </a:p>
+                  </a:txBody>
+                  <a:tcPr/>
+                </a:tc>
+                <a:tc>
+                  <a:txBody>
+                    <a:bodyPr/>
+                    <a:lstStyle/>
+                    <a:p>
+                      <a:r>
+                        <a:rPr lang="en-NZ" dirty="0" err="1" smtClean="0"/>
+                        <a:t>Iter</a:t>
+                      </a:r>
+                      <a:r>
+                        <a:rPr lang="en-NZ" dirty="0" smtClean="0"/>
+                        <a:t>. X</a:t>
+                      </a:r>
+                      <a:endParaRPr lang="en-NZ" dirty="0"/>
+                    </a:p>
+                  </a:txBody>
+                  <a:tcPr/>
+                </a:tc>
+              </a:tr>
+              <a:tr h="370840">
+                <a:tc>
+                  <a:txBody>
+                    <a:bodyPr/>
+                    <a:lstStyle/>
+                    <a:p>
+                      <a:r>
+                        <a:rPr lang="en-NZ" dirty="0" smtClean="0"/>
+                        <a:t>Child #1</a:t>
+                      </a:r>
+                      <a:endParaRPr lang="en-NZ" dirty="0"/>
+                    </a:p>
+                  </a:txBody>
+                  <a:tcPr/>
+                </a:tc>
+                <a:tc>
+                  <a:txBody>
+                    <a:bodyPr/>
+                    <a:lstStyle/>
+                    <a:p>
+                      <a:r>
+                        <a:rPr lang="en-NZ" dirty="0" smtClean="0"/>
+                        <a:t>NA</a:t>
+                      </a:r>
+                      <a:endParaRPr lang="en-NZ" dirty="0"/>
+                    </a:p>
+                  </a:txBody>
+                  <a:tcPr/>
+                </a:tc>
+                <a:tc>
+                  <a:txBody>
+                    <a:bodyPr/>
+                    <a:lstStyle/>
+                    <a:p>
+                      <a:r>
+                        <a:rPr lang="en-NZ" dirty="0" smtClean="0"/>
+                        <a:t>NA</a:t>
+                      </a:r>
+                      <a:endParaRPr lang="en-NZ" dirty="0"/>
+                    </a:p>
+                  </a:txBody>
+                  <a:tcPr/>
+                </a:tc>
+                <a:tc>
+                  <a:txBody>
+                    <a:bodyPr/>
+                    <a:lstStyle/>
+                    <a:p>
+                      <a:r>
+                        <a:rPr lang="en-NZ" dirty="0" smtClean="0"/>
+                        <a:t>30</a:t>
+                      </a:r>
+                      <a:endParaRPr lang="en-NZ" dirty="0"/>
+                    </a:p>
+                  </a:txBody>
+                  <a:tcPr/>
+                </a:tc>
+                <a:tc>
+                  <a:txBody>
+                    <a:bodyPr/>
+                    <a:lstStyle/>
+                    <a:p>
+                      <a:r>
+                        <a:rPr lang="en-NZ" dirty="0" smtClean="0"/>
+                        <a:t>NA</a:t>
+                      </a:r>
+                      <a:endParaRPr lang="en-NZ" dirty="0"/>
+                    </a:p>
+                  </a:txBody>
+                  <a:tcPr/>
+                </a:tc>
+                <a:tc>
+                  <a:txBody>
+                    <a:bodyPr/>
+                    <a:lstStyle/>
+                    <a:p>
+                      <a:r>
+                        <a:rPr lang="en-NZ" dirty="0" smtClean="0"/>
+                        <a:t>NA</a:t>
+                      </a:r>
+                      <a:endParaRPr lang="en-NZ" dirty="0"/>
+                    </a:p>
+                  </a:txBody>
+                  <a:tcPr/>
+                </a:tc>
+              </a:tr>
+              <a:tr h="370840">
+                <a:tc>
+                  <a:txBody>
+                    <a:bodyPr/>
+                    <a:lstStyle/>
+                    <a:p>
+                      <a:r>
+                        <a:rPr lang="en-NZ" dirty="0" smtClean="0"/>
+                        <a:t>Child</a:t>
+                      </a:r>
+                      <a:r>
+                        <a:rPr lang="en-NZ" baseline="0" dirty="0" smtClean="0"/>
+                        <a:t> #2</a:t>
+                      </a:r>
+                      <a:endParaRPr lang="en-NZ" dirty="0"/>
+                    </a:p>
+                  </a:txBody>
+                  <a:tcPr/>
+                </a:tc>
+                <a:tc>
+                  <a:txBody>
+                    <a:bodyPr/>
+                    <a:lstStyle/>
+                    <a:p>
+                      <a:r>
+                        <a:rPr lang="en-NZ" dirty="0" smtClean="0"/>
+                        <a:t>NA</a:t>
+                      </a:r>
+                      <a:endParaRPr lang="en-NZ" dirty="0"/>
+                    </a:p>
+                  </a:txBody>
+                  <a:tcPr/>
+                </a:tc>
+                <a:tc>
+                  <a:txBody>
+                    <a:bodyPr/>
+                    <a:lstStyle/>
+                    <a:p>
+                      <a:r>
+                        <a:rPr lang="en-NZ" dirty="0" smtClean="0"/>
+                        <a:t>40</a:t>
+                      </a:r>
+                      <a:endParaRPr lang="en-NZ" dirty="0"/>
+                    </a:p>
+                  </a:txBody>
+                  <a:tcPr/>
+                </a:tc>
+                <a:tc>
+                  <a:txBody>
+                    <a:bodyPr/>
+                    <a:lstStyle/>
+                    <a:p>
+                      <a:r>
+                        <a:rPr lang="en-NZ" dirty="0" smtClean="0"/>
+                        <a:t>NA</a:t>
+                      </a:r>
+                      <a:endParaRPr lang="en-NZ" dirty="0"/>
+                    </a:p>
+                  </a:txBody>
+                  <a:tcPr/>
+                </a:tc>
+                <a:tc>
+                  <a:txBody>
+                    <a:bodyPr/>
+                    <a:lstStyle/>
+                    <a:p>
+                      <a:r>
+                        <a:rPr lang="en-NZ" dirty="0" smtClean="0"/>
+                        <a:t>NA</a:t>
+                      </a:r>
+                      <a:endParaRPr lang="en-NZ" dirty="0"/>
+                    </a:p>
+                  </a:txBody>
+                  <a:tcPr/>
+                </a:tc>
+                <a:tc>
+                  <a:txBody>
+                    <a:bodyPr/>
+                    <a:lstStyle/>
+                    <a:p>
+                      <a:r>
+                        <a:rPr lang="en-NZ" dirty="0" smtClean="0"/>
+                        <a:t>NA</a:t>
+                      </a:r>
+                      <a:endParaRPr lang="en-NZ" dirty="0"/>
+                    </a:p>
+                  </a:txBody>
+                  <a:tcPr/>
+                </a:tc>
+              </a:tr>
+              <a:tr h="370840">
+                <a:tc>
+                  <a:txBody>
+                    <a:bodyPr/>
+                    <a:lstStyle/>
+                    <a:p>
+                      <a:pPr marL="0" marR="0" indent="0" algn="l" defTabSz="914400" rtl="0" eaLnBrk="1" fontAlgn="auto" latinLnBrk="0" hangingPunct="1">
+                        <a:lnSpc>
+                          <a:spcPct val="100000"/>
+                        </a:lnSpc>
+                        <a:spcBef>
+                          <a:spcPts val="0"/>
+                        </a:spcBef>
+                        <a:spcAft>
+                          <a:spcPts val="0"/>
+                        </a:spcAft>
+                        <a:buClrTx/>
+                        <a:buSzTx/>
+                        <a:buFontTx/>
+                        <a:buNone/>
+                        <a:tabLst/>
+                        <a:defRPr/>
+                      </a:pPr>
+                      <a:r>
+                        <a:rPr lang="en-NZ" dirty="0" smtClean="0"/>
+                        <a:t>⁞</a:t>
+                      </a:r>
+                    </a:p>
+                  </a:txBody>
+                  <a:tcPr/>
+                </a:tc>
+                <a:tc>
+                  <a:txBody>
+                    <a:bodyPr/>
+                    <a:lstStyle/>
+                    <a:p>
+                      <a:r>
+                        <a:rPr lang="en-NZ" dirty="0" smtClean="0"/>
+                        <a:t>⁞</a:t>
+                      </a:r>
+                      <a:endParaRPr lang="en-NZ" dirty="0"/>
+                    </a:p>
+                  </a:txBody>
+                  <a:tcPr/>
+                </a:tc>
+                <a:tc>
+                  <a:txBody>
+                    <a:bodyPr/>
+                    <a:lstStyle/>
+                    <a:p>
+                      <a:r>
+                        <a:rPr lang="en-NZ" dirty="0" smtClean="0"/>
+                        <a:t>⁞</a:t>
+                      </a:r>
+                      <a:endParaRPr lang="en-NZ" dirty="0"/>
+                    </a:p>
+                  </a:txBody>
+                  <a:tcPr/>
+                </a:tc>
+                <a:tc>
+                  <a:txBody>
+                    <a:bodyPr/>
+                    <a:lstStyle/>
+                    <a:p>
+                      <a:r>
+                        <a:rPr lang="en-NZ" dirty="0" smtClean="0"/>
+                        <a:t>⁞</a:t>
+                      </a:r>
+                      <a:endParaRPr lang="en-NZ" dirty="0"/>
+                    </a:p>
+                  </a:txBody>
+                  <a:tcPr/>
+                </a:tc>
+                <a:tc>
+                  <a:txBody>
+                    <a:bodyPr/>
+                    <a:lstStyle/>
+                    <a:p>
+                      <a:r>
+                        <a:rPr lang="en-NZ" dirty="0" smtClean="0"/>
+                        <a:t>⁞</a:t>
+                      </a:r>
+                      <a:endParaRPr lang="en-NZ" dirty="0"/>
+                    </a:p>
+                  </a:txBody>
+                  <a:tcPr/>
+                </a:tc>
+                <a:tc>
+                  <a:txBody>
+                    <a:bodyPr/>
+                    <a:lstStyle/>
+                    <a:p>
+                      <a:r>
+                        <a:rPr lang="en-NZ" dirty="0" smtClean="0"/>
+                        <a:t>⁞</a:t>
+                      </a:r>
+                      <a:endParaRPr lang="en-NZ" dirty="0"/>
+                    </a:p>
+                  </a:txBody>
+                  <a:tcPr/>
+                </a:tc>
+              </a:tr>
+              <a:tr h="370840">
+                <a:tc>
+                  <a:txBody>
+                    <a:bodyPr/>
+                    <a:lstStyle/>
+                    <a:p>
+                      <a:r>
+                        <a:rPr lang="en-NZ" dirty="0" smtClean="0"/>
+                        <a:t>Child X</a:t>
+                      </a:r>
+                      <a:endParaRPr lang="en-NZ" dirty="0"/>
+                    </a:p>
+                  </a:txBody>
+                  <a:tcPr/>
+                </a:tc>
+                <a:tc>
+                  <a:txBody>
+                    <a:bodyPr/>
+                    <a:lstStyle/>
+                    <a:p>
+                      <a:r>
+                        <a:rPr lang="en-NZ" dirty="0" smtClean="0"/>
+                        <a:t>NA</a:t>
+                      </a:r>
+                      <a:endParaRPr lang="en-NZ" dirty="0"/>
+                    </a:p>
+                  </a:txBody>
+                  <a:tcPr/>
+                </a:tc>
+                <a:tc>
+                  <a:txBody>
+                    <a:bodyPr/>
+                    <a:lstStyle/>
+                    <a:p>
+                      <a:r>
+                        <a:rPr lang="en-NZ" dirty="0" smtClean="0"/>
+                        <a:t>27</a:t>
+                      </a:r>
+                      <a:endParaRPr lang="en-NZ" dirty="0"/>
+                    </a:p>
+                  </a:txBody>
+                  <a:tcPr/>
+                </a:tc>
+                <a:tc>
+                  <a:txBody>
+                    <a:bodyPr/>
+                    <a:lstStyle/>
+                    <a:p>
+                      <a:r>
+                        <a:rPr lang="en-NZ" dirty="0" smtClean="0"/>
+                        <a:t>NA</a:t>
+                      </a:r>
+                      <a:endParaRPr lang="en-NZ" dirty="0"/>
+                    </a:p>
+                  </a:txBody>
+                  <a:tcPr/>
+                </a:tc>
+                <a:tc>
+                  <a:txBody>
+                    <a:bodyPr/>
+                    <a:lstStyle/>
+                    <a:p>
+                      <a:r>
+                        <a:rPr lang="en-NZ" dirty="0" smtClean="0"/>
+                        <a:t>28</a:t>
+                      </a:r>
+                      <a:endParaRPr lang="en-NZ" dirty="0"/>
+                    </a:p>
+                  </a:txBody>
+                  <a:tcPr/>
+                </a:tc>
+                <a:tc>
+                  <a:txBody>
+                    <a:bodyPr/>
+                    <a:lstStyle/>
+                    <a:p>
+                      <a:r>
+                        <a:rPr lang="en-NZ" dirty="0" smtClean="0"/>
+                        <a:t>NA</a:t>
+                      </a:r>
+                      <a:endParaRPr lang="en-NZ" dirty="0"/>
+                    </a:p>
+                  </a:txBody>
+                  <a:tcPr/>
+                </a:tc>
+              </a:tr>
+            </a:tbl>
+          </a:graphicData>
+        </a:graphic>
+      </p:graphicFrame>
     </p:spTree>
     <p:extLst>
       <p:ext uri="{BB962C8B-B14F-4D97-AF65-F5344CB8AC3E}">
-        <p14:creationId xmlns:p14="http://schemas.microsoft.com/office/powerpoint/2010/main" val="304611099"/>
+        <p14:creationId xmlns:p14="http://schemas.microsoft.com/office/powerpoint/2010/main" val="3977740464"/>
       </p:ext>
     </p:extLst>
   </p:cSld>
@@ -9641,15 +10141,7 @@
           <a:p>
             <a:r>
               <a:rPr lang="en-NZ" dirty="0" smtClean="0"/>
-              <a:t>Simulation modules (</a:t>
-            </a:r>
-            <a:r>
-              <a:rPr lang="en-NZ" dirty="0" err="1" smtClean="0"/>
-              <a:t>Simmodule</a:t>
-            </a:r>
-            <a:r>
-              <a:rPr lang="en-NZ" dirty="0" smtClean="0"/>
-              <a:t>)</a:t>
+              <a:t>Propensity arrays</a:t>
             </a:r>
             <a:endParaRPr lang="en-NZ" dirty="0"/>
           </a:p>
@@ -9671,50 +10163,52 @@
           <a:lstStyle/>
           <a:p>
             <a:r>
+              <a:rPr lang="en-NZ" dirty="0" smtClean="0"/>
+              <a:t>consist </a:t>
+            </a:r>
+            <a:r>
               <a:rPr lang="en-NZ" dirty="0"/>
-              <a:t>A simulation module is really the core of a </a:t>
+              <a:t>of:</a:t>
+            </a:r>
+          </a:p>
+          <a:p>
+            <a:pPr lvl="1"/>
+            <a:r>
+              <a:rPr lang="en-NZ" dirty="0"/>
+              <a:t>rows - the individual micro-units</a:t>
+            </a:r>
+          </a:p>
+          <a:p>
+            <a:pPr lvl="1"/>
+            <a:r>
+              <a:rPr lang="en-NZ" dirty="0"/>
+              <a:t>cols - categories, with one less column than </a:t>
             </a:r>
             <a:r>
               <a:rPr lang="en-NZ" dirty="0" smtClean="0"/>
-              <a:t>simulation and where all the work is done</a:t>
-            </a:r>
-          </a:p>
-          <a:p>
-            <a:r>
-              <a:rPr lang="en-NZ" dirty="0" smtClean="0"/>
-              <a:t>It </a:t>
+              <a:t>the total </a:t>
             </a:r>
             <a:r>
               <a:rPr lang="en-NZ" dirty="0"/>
-              <a:t>contains the code and output for a distinct </a:t>
-            </a:r>
-            <a:r>
-              <a:rPr lang="en-NZ" dirty="0" smtClean="0"/>
-              <a:t>set </a:t>
-            </a:r>
+              <a:t>number of categories</a:t>
+            </a:r>
+          </a:p>
+          <a:p>
+            <a:pPr lvl="1"/>
             <a:r>
               <a:rPr lang="en-NZ" dirty="0"/>
-              <a:t>of results generated, </a:t>
-            </a:r>
-            <a:r>
-              <a:rPr lang="en-NZ" dirty="0" err="1"/>
-              <a:t>eg</a:t>
-            </a:r>
-            <a:r>
-              <a:rPr lang="en-NZ" dirty="0"/>
-              <a:t>: health outcomes for years 1 - 10</a:t>
-            </a:r>
-            <a:r>
-              <a:rPr lang="en-NZ" dirty="0" smtClean="0"/>
-              <a:t>.</a:t>
-            </a:r>
+              <a:t>z dim - iterations/years</a:t>
+            </a:r>
+          </a:p>
+          <a:p>
+            <a:endParaRPr lang="en-NZ" dirty="0"/>
           </a:p>
         </p:txBody>
       </p:sp>
     </p:spTree>
     <p:extLst>
       <p:ext uri="{BB962C8B-B14F-4D97-AF65-F5344CB8AC3E}">
-        <p14:creationId xmlns:p14="http://schemas.microsoft.com/office/powerpoint/2010/main" val="1909179328"/>
+        <p14:creationId xmlns:p14="http://schemas.microsoft.com/office/powerpoint/2010/main" val="304611099"/>
       </p:ext>
     </p:extLst>
   </p:cSld>
@@ -9757,12 +10251,16 @@
           <a:lstStyle/>
           <a:p>
             <a:r>
+              <a:rPr lang="en-NZ" dirty="0" smtClean="0"/>
+              <a:t>Simulation modules (</a:t>
+            </a:r>
+            <a:r>
               <a:rPr lang="en-NZ" dirty="0" err="1" smtClean="0"/>
               <a:t>Simmodule</a:t>
             </a:r>
             <a:r>
               <a:rPr lang="en-NZ" dirty="0" smtClean="0"/>
-              <a:t> functions</a:t>
+              <a:t>)</a:t>
             </a:r>
             <a:endParaRPr lang="en-NZ" dirty="0"/>
           </a:p>
@@ -9780,107 +10278,54 @@
         </p:nvSpPr>
         <p:spPr/>
         <p:txBody>
-          <a:bodyPr>
-            <a:normAutofit fontScale="85000" lnSpcReduction="10000"/>
-          </a:bodyPr>
+          <a:bodyPr/>
           <a:lstStyle/>
           <a:p>
             <a:r>
-              <a:rPr lang="en-NZ" dirty="0" err="1" smtClean="0"/>
-              <a:t>simulateRun</a:t>
-            </a:r>
-            <a:endParaRPr lang="en-NZ" dirty="0" smtClean="0"/>
-          </a:p>
-          <a:p>
-            <a:pPr lvl="1"/>
-            <a:r>
               <a:rPr lang="en-NZ" dirty="0"/>
-              <a:t>t</a:t>
+              <a:t>A simulation module is really the core of a </a:t>
             </a:r>
             <a:r>
               <a:rPr lang="en-NZ" dirty="0" smtClean="0"/>
-              <a:t>ransforms the </a:t>
-            </a:r>
-            <a:r>
-              <a:rPr lang="en-NZ" dirty="0" err="1" smtClean="0"/>
-              <a:t>simframe</a:t>
-            </a:r>
+              <a:t>simulation and where all the work is done</a:t>
+            </a:r>
+          </a:p>
+          <a:p>
             <a:r>
               <a:rPr lang="en-NZ" dirty="0" smtClean="0"/>
-              <a:t> through multiple iterations. Produces outcomes at each iteration.</a:t>
-            </a:r>
-          </a:p>
-          <a:p>
-            <a:r>
-              <a:rPr lang="en-NZ" dirty="0" err="1" smtClean="0"/>
-              <a:t>appendRunStats</a:t>
-            </a:r>
-            <a:endParaRPr lang="en-NZ" dirty="0" smtClean="0"/>
-          </a:p>
-          <a:p>
-            <a:pPr lvl="1"/>
+              <a:t>It </a:t>
+            </a:r>
+            <a:r>
+              <a:rPr lang="en-NZ" dirty="0"/>
+              <a:t>contains the code and output for a distinct </a:t>
+            </a:r>
             <a:r>
               <a:rPr lang="en-NZ" dirty="0" smtClean="0"/>
-              <a:t>generates run stats, </a:t>
-            </a:r>
-            <a:r>
-              <a:rPr lang="en-NZ" dirty="0" err="1" smtClean="0"/>
+              <a:t>set </a:t>
+            </a:r>
+            <a:r>
+              <a:rPr lang="en-NZ" dirty="0"/>
+              <a:t>of results generated, </a:t>
+            </a:r>
+            <a:r>
+              <a:rPr lang="en-NZ" dirty="0" err="1"/>
               <a:t>eg</a:t>
             </a:r>
             <a:r>
+              <a:rPr lang="en-NZ" dirty="0"/>
+              <a:t>: health outcomes for years 1 - 10</a:t>
+            </a:r>
+            <a:r>
               <a:rPr lang="en-NZ" dirty="0" smtClean="0"/>
-              <a:t>: frequencies, means</a:t>
-            </a:r>
-            <a:r>
-              <a:rPr lang="en-NZ" dirty="0"/>
-              <a:t>, </a:t>
-            </a:r>
-            <a:r>
-              <a:rPr lang="en-NZ" dirty="0" err="1"/>
-              <a:t>quantiles</a:t>
-            </a:r>
-            <a:r>
-              <a:rPr lang="en-NZ" dirty="0"/>
-              <a:t>, and </a:t>
-            </a:r>
-            <a:r>
-              <a:rPr lang="en-NZ" dirty="0" smtClean="0"/>
-              <a:t>summaries for any outcome and iteration. Stores them with stats from previous runs.</a:t>
-            </a:r>
-          </a:p>
-          <a:p>
-            <a:r>
-              <a:rPr lang="en-NZ" dirty="0" err="1" smtClean="0"/>
-              <a:t>collateRunStats</a:t>
-            </a:r>
-            <a:endParaRPr lang="en-NZ" dirty="0" smtClean="0"/>
-          </a:p>
-          <a:p>
-            <a:pPr lvl="1"/>
-            <a:r>
-              <a:rPr lang="en-NZ" dirty="0" smtClean="0"/>
-              <a:t>calculates the mean of run stats over multiple runs and prepares results for display by adding column names etc.</a:t>
-            </a:r>
-          </a:p>
-          <a:p>
-            <a:r>
-              <a:rPr lang="en-NZ" dirty="0" smtClean="0"/>
-              <a:t>These functions will be explained in more detail later</a:t>
-            </a:r>
-          </a:p>
-          <a:p>
-            <a:endParaRPr lang="en-NZ" dirty="0"/>
-          </a:p>
-          <a:p>
-            <a:pPr lvl="1"/>
-            <a:endParaRPr lang="en-NZ" dirty="0"/>
+              <a:t>.</a:t>
+            </a:r>
           </a:p>
         </p:txBody>
       </p:sp>
     </p:spTree>
     <p:extLst>
       <p:ext uri="{BB962C8B-B14F-4D97-AF65-F5344CB8AC3E}">
-        <p14:creationId xmlns:p14="http://schemas.microsoft.com/office/powerpoint/2010/main" val="1227423083"/>
+        <p14:creationId xmlns:p14="http://schemas.microsoft.com/office/powerpoint/2010/main" val="1909179328"/>
       </p:ext>
     </p:extLst>
   </p:cSld>
@@ -9928,6 +10373,172 @@
             </a:r>
             <a:r>
               <a:rPr lang="en-NZ" dirty="0" smtClean="0"/>
+              <a:t> functions</a:t>
+            </a:r>
+            <a:endParaRPr lang="en-NZ" dirty="0"/>
+          </a:p>
+        </p:txBody>
+      </p:sp>
+      <p:sp>
+        <p:nvSpPr>
+          <p:cNvPr id="3" name="Content Placeholder 2"/>
+          <p:cNvSpPr>
+            <a:spLocks noGrp="1"/>
+          </p:cNvSpPr>
+          <p:nvPr>
+            <p:ph idx="1"/>
+          </p:nvPr>
+        </p:nvSpPr>
+        <p:spPr/>
+        <p:txBody>
+          <a:bodyPr>
+            <a:normAutofit fontScale="85000" lnSpcReduction="10000"/>
+          </a:bodyPr>
+          <a:lstStyle/>
+          <a:p>
+            <a:r>
+              <a:rPr lang="en-NZ" dirty="0" err="1" smtClean="0"/>
+              <a:t>simulateRun</a:t>
+            </a:r>
+            <a:endParaRPr lang="en-NZ" dirty="0" smtClean="0"/>
+          </a:p>
+          <a:p>
+            <a:pPr lvl="1"/>
+            <a:r>
+              <a:rPr lang="en-NZ" dirty="0"/>
+              <a:t>t</a:t>
+            </a:r>
+            <a:r>
+              <a:rPr lang="en-NZ" dirty="0" smtClean="0"/>
+              <a:t>ransforms the </a:t>
+            </a:r>
+            <a:r>
+              <a:rPr lang="en-NZ" dirty="0" err="1" smtClean="0"/>
+              <a:t>simframe</a:t>
+            </a:r>
+            <a:r>
+              <a:rPr lang="en-NZ" dirty="0" smtClean="0"/>
+              <a:t> through multiple iterations. Produces outcomes at each iteration.</a:t>
+            </a:r>
+          </a:p>
+          <a:p>
+            <a:r>
+              <a:rPr lang="en-NZ" dirty="0" err="1" smtClean="0"/>
+              <a:t>appendRunStats</a:t>
+            </a:r>
+            <a:endParaRPr lang="en-NZ" dirty="0" smtClean="0"/>
+          </a:p>
+          <a:p>
+            <a:pPr lvl="1"/>
+            <a:r>
+              <a:rPr lang="en-NZ" dirty="0" smtClean="0"/>
+              <a:t>generates run stats, </a:t>
+            </a:r>
+            <a:r>
+              <a:rPr lang="en-NZ" dirty="0" err="1" smtClean="0"/>
+              <a:t>eg</a:t>
+            </a:r>
+            <a:r>
+              <a:rPr lang="en-NZ" dirty="0" smtClean="0"/>
+              <a:t>: frequencies, means</a:t>
+            </a:r>
+            <a:r>
+              <a:rPr lang="en-NZ" dirty="0"/>
+              <a:t>, </a:t>
+            </a:r>
+            <a:r>
+              <a:rPr lang="en-NZ" dirty="0" err="1"/>
+              <a:t>quantiles</a:t>
+            </a:r>
+            <a:r>
+              <a:rPr lang="en-NZ" dirty="0"/>
+              <a:t>, and </a:t>
+            </a:r>
+            <a:r>
+              <a:rPr lang="en-NZ" dirty="0" smtClean="0"/>
+              <a:t>summaries for any outcome and iteration. Stores them with stats from previous runs.</a:t>
+            </a:r>
+          </a:p>
+          <a:p>
+            <a:r>
+              <a:rPr lang="en-NZ" dirty="0" err="1" smtClean="0"/>
+              <a:t>collateRunStats</a:t>
+            </a:r>
+            <a:endParaRPr lang="en-NZ" dirty="0" smtClean="0"/>
+          </a:p>
+          <a:p>
+            <a:pPr lvl="1"/>
+            <a:r>
+              <a:rPr lang="en-NZ" dirty="0" smtClean="0"/>
+              <a:t>calculates the mean of run stats over multiple runs and prepares results for display by adding column names etc.</a:t>
+            </a:r>
+          </a:p>
+          <a:p>
+            <a:r>
+              <a:rPr lang="en-NZ" dirty="0" smtClean="0"/>
+              <a:t>These functions will be explained in more detail later</a:t>
+            </a:r>
+          </a:p>
+          <a:p>
+            <a:endParaRPr lang="en-NZ" dirty="0"/>
+          </a:p>
+          <a:p>
+            <a:pPr lvl="1"/>
+            <a:endParaRPr lang="en-NZ" dirty="0"/>
+          </a:p>
+        </p:txBody>
+      </p:sp>
+    </p:spTree>
+    <p:extLst>
+      <p:ext uri="{BB962C8B-B14F-4D97-AF65-F5344CB8AC3E}">
+        <p14:creationId xmlns:p14="http://schemas.microsoft.com/office/powerpoint/2010/main" val="1227423083"/>
+      </p:ext>
+    </p:extLst>
+  </p:cSld>
+  <p:clrMapOvr>
+    <a:masterClrMapping/>
+  </p:clrMapOvr>
+</p:sld>
+</file>
+
+<file path=ppt/slides/slide15.xml><?xml version="1.0" encoding="utf-8"?>
+<p:sld xmlns:a="http://schemas.openxmlformats.org/drawingml/2006/main" xmlns:r="http://schemas.openxmlformats.org/officeDocument/2006/relationships" xmlns:p="http://schemas.openxmlformats.org/presentationml/2006/main">
+  <p:cSld>
+    <p:spTree>
+      <p:nvGrpSpPr>
+        <p:cNvPr id="1" name=""/>
+        <p:cNvGrpSpPr/>
+        <p:nvPr/>
+      </p:nvGrpSpPr>
+      <p:grpSpPr>
+        <a:xfrm>
+          <a:off x="0" y="0"/>
+          <a:ext cx="0" cy="0"/>
+          <a:chOff x="0" y="0"/>
+          <a:chExt cx="0" cy="0"/>
+        </a:xfrm>
+      </p:grpSpPr>
+      <p:sp>
+        <p:nvSpPr>
+          <p:cNvPr id="2" name="Title 1"/>
+          <p:cNvSpPr>
+            <a:spLocks noGrp="1"/>
+          </p:cNvSpPr>
+          <p:nvPr>
+            <p:ph type="title"/>
+          </p:nvPr>
+        </p:nvSpPr>
+        <p:spPr/>
+        <p:txBody>
+          <a:bodyPr/>
+          <a:lstStyle/>
+          <a:p>
+            <a:r>
+              <a:rPr lang="en-NZ" dirty="0" err="1" smtClean="0"/>
+              <a:t>Simmodule</a:t>
+            </a:r>
+            <a:r>
+              <a:rPr lang="en-NZ" dirty="0" smtClean="0"/>
               <a:t> variables</a:t>
             </a:r>
             <a:endParaRPr lang="en-NZ" dirty="0"/>
@@ -10113,7 +10724,7 @@
 </p:sld>
 </file>
 
-<file path=ppt/slides/slide15.xml><?xml version="1.0" encoding="utf-8"?>
+<file path=ppt/slides/slide16.xml><?xml version="1.0" encoding="utf-8"?>
 <p:sld xmlns:a="http://schemas.openxmlformats.org/drawingml/2006/main" xmlns:r="http://schemas.openxmlformats.org/officeDocument/2006/relationships" xmlns:p="http://schemas.openxmlformats.org/presentationml/2006/main">
   <p:cSld>
     <p:spTree>
@@ -10212,517 +10823,6 @@
           </a:p>
         </p:txBody>
       </p:sp>
-    </p:spTree>
-  </p:cSld>
-  <p:clrMapOvr>
-    <a:masterClrMapping/>
-  </p:clrMapOvr>
-</p:sld>
-</file>
-
-<file path=ppt/slides/slide16.xml><?xml version="1.0" encoding="utf-8"?>
-<p:sld xmlns:a="http://schemas.openxmlformats.org/drawingml/2006/main" xmlns:r="http://schemas.openxmlformats.org/officeDocument/2006/relationships" xmlns:p="http://schemas.openxmlformats.org/presentationml/2006/main">
-  <p:cSld>
-    <p:spTree>
-      <p:nvGrpSpPr>
-        <p:cNvPr id="1" name=""/>
-        <p:cNvGrpSpPr/>
-        <p:nvPr/>
-      </p:nvGrpSpPr>
-      <p:grpSpPr>
-        <a:xfrm>
-          <a:off x="0" y="0"/>
-          <a:ext cx="0" cy="0"/>
-          <a:chOff x="0" y="0"/>
-          <a:chExt cx="0" cy="0"/>
-        </a:xfrm>
-      </p:grpSpPr>
-      <p:sp>
-        <p:nvSpPr>
-          <p:cNvPr id="2" name="Title 1"/>
-          <p:cNvSpPr>
-            <a:spLocks noGrp="1"/>
-          </p:cNvSpPr>
-          <p:nvPr>
-            <p:ph type="title"/>
-          </p:nvPr>
-        </p:nvSpPr>
-        <p:spPr/>
-        <p:txBody>
-          <a:bodyPr/>
-          <a:lstStyle/>
-          <a:p>
-            <a:r>
-              <a:rPr lang="en-NZ" dirty="0" err="1" smtClean="0"/>
-              <a:t>Simframe</a:t>
-            </a:r>
-            <a:endParaRPr lang="en-NZ" dirty="0"/>
-          </a:p>
-        </p:txBody>
-      </p:sp>
-      <p:graphicFrame>
-        <p:nvGraphicFramePr>
-          <p:cNvPr id="4" name="Content Placeholder 3"/>
-          <p:cNvGraphicFramePr>
-            <a:graphicFrameLocks noGrp="1"/>
-          </p:cNvGraphicFramePr>
-          <p:nvPr>
-            <p:ph idx="1"/>
-          </p:nvPr>
-        </p:nvGraphicFramePr>
-        <p:xfrm>
-          <a:off x="1763688" y="1628800"/>
-          <a:ext cx="5606836" cy="2225040"/>
-        </p:xfrm>
-        <a:graphic>
-          <a:graphicData uri="http://schemas.openxmlformats.org/drawingml/2006/table">
-            <a:tbl>
-              <a:tblPr firstRow="1" bandRow="1">
-                <a:tableStyleId>{5C22544A-7EE6-4342-B048-85BDC9FD1C3A}</a:tableStyleId>
-              </a:tblPr>
-              <a:tblGrid>
-                <a:gridCol w="514400"/>
-                <a:gridCol w="792088"/>
-                <a:gridCol w="863918"/>
-                <a:gridCol w="1790510"/>
-                <a:gridCol w="1645920"/>
-              </a:tblGrid>
-              <a:tr h="370840">
-                <a:tc>
-                  <a:txBody>
-                    <a:bodyPr/>
-                    <a:lstStyle/>
-                    <a:p>
-                      <a:r>
-                        <a:rPr lang="en-NZ" dirty="0" smtClean="0"/>
-                        <a:t>ID</a:t>
-                      </a:r>
-                      <a:endParaRPr lang="en-NZ" dirty="0"/>
-                    </a:p>
-                  </a:txBody>
-                  <a:tcPr/>
-                </a:tc>
-                <a:tc>
-                  <a:txBody>
-                    <a:bodyPr/>
-                    <a:lstStyle/>
-                    <a:p>
-                      <a:r>
-                        <a:rPr lang="en-NZ" dirty="0" smtClean="0"/>
-                        <a:t>Age</a:t>
-                      </a:r>
-                      <a:endParaRPr lang="en-NZ" dirty="0"/>
-                    </a:p>
-                  </a:txBody>
-                  <a:tcPr/>
-                </a:tc>
-                <a:tc>
-                  <a:txBody>
-                    <a:bodyPr/>
-                    <a:lstStyle/>
-                    <a:p>
-                      <a:r>
-                        <a:rPr lang="en-NZ" dirty="0" smtClean="0"/>
-                        <a:t>Health</a:t>
-                      </a:r>
-                      <a:endParaRPr lang="en-NZ" dirty="0"/>
-                    </a:p>
-                  </a:txBody>
-                  <a:tcPr/>
-                </a:tc>
-                <a:tc>
-                  <a:txBody>
-                    <a:bodyPr/>
-                    <a:lstStyle/>
-                    <a:p>
-                      <a:r>
-                        <a:rPr lang="en-NZ" dirty="0" err="1" smtClean="0"/>
-                        <a:t>Health_previous</a:t>
-                      </a:r>
-                      <a:endParaRPr lang="en-NZ" dirty="0"/>
-                    </a:p>
-                  </a:txBody>
-                  <a:tcPr/>
-                </a:tc>
-                <a:tc>
-                  <a:txBody>
-                    <a:bodyPr/>
-                    <a:lstStyle/>
-                    <a:p>
-                      <a:r>
-                        <a:rPr lang="en-NZ" dirty="0" smtClean="0"/>
-                        <a:t>Earnings</a:t>
-                      </a:r>
-                      <a:endParaRPr lang="en-NZ" dirty="0"/>
-                    </a:p>
-                  </a:txBody>
-                  <a:tcPr/>
-                </a:tc>
-              </a:tr>
-              <a:tr h="370840">
-                <a:tc>
-                  <a:txBody>
-                    <a:bodyPr/>
-                    <a:lstStyle/>
-                    <a:p>
-                      <a:r>
-                        <a:rPr lang="en-NZ" dirty="0" smtClean="0"/>
-                        <a:t>1</a:t>
-                      </a:r>
-                      <a:endParaRPr lang="en-NZ" dirty="0"/>
-                    </a:p>
-                  </a:txBody>
-                  <a:tcPr/>
-                </a:tc>
-                <a:tc>
-                  <a:txBody>
-                    <a:bodyPr/>
-                    <a:lstStyle/>
-                    <a:p>
-                      <a:r>
-                        <a:rPr lang="en-NZ" dirty="0" smtClean="0"/>
-                        <a:t>2</a:t>
-                      </a:r>
-                      <a:endParaRPr lang="en-NZ" dirty="0"/>
-                    </a:p>
-                  </a:txBody>
-                  <a:tcPr/>
-                </a:tc>
-                <a:tc>
-                  <a:txBody>
-                    <a:bodyPr/>
-                    <a:lstStyle/>
-                    <a:p>
-                      <a:r>
-                        <a:rPr lang="en-NZ" dirty="0" smtClean="0"/>
-                        <a:t>0</a:t>
-                      </a:r>
-                      <a:endParaRPr lang="en-NZ" dirty="0"/>
-                    </a:p>
-                  </a:txBody>
-                  <a:tcPr/>
-                </a:tc>
-                <a:tc>
-                  <a:txBody>
-                    <a:bodyPr/>
-                    <a:lstStyle/>
-                    <a:p>
-                      <a:r>
-                        <a:rPr lang="en-NZ" dirty="0" smtClean="0"/>
-                        <a:t>NA</a:t>
-                      </a:r>
-                      <a:endParaRPr lang="en-NZ" dirty="0"/>
-                    </a:p>
-                  </a:txBody>
-                  <a:tcPr/>
-                </a:tc>
-                <a:tc>
-                  <a:txBody>
-                    <a:bodyPr/>
-                    <a:lstStyle/>
-                    <a:p>
-                      <a:r>
-                        <a:rPr lang="en-NZ" dirty="0" smtClean="0"/>
-                        <a:t>0</a:t>
-                      </a:r>
-                      <a:endParaRPr lang="en-NZ" dirty="0"/>
-                    </a:p>
-                  </a:txBody>
-                  <a:tcPr/>
-                </a:tc>
-              </a:tr>
-              <a:tr h="370840">
-                <a:tc>
-                  <a:txBody>
-                    <a:bodyPr/>
-                    <a:lstStyle/>
-                    <a:p>
-                      <a:r>
-                        <a:rPr lang="en-NZ" dirty="0" smtClean="0"/>
-                        <a:t>2</a:t>
-                      </a:r>
-                      <a:endParaRPr lang="en-NZ" dirty="0"/>
-                    </a:p>
-                  </a:txBody>
-                  <a:tcPr/>
-                </a:tc>
-                <a:tc>
-                  <a:txBody>
-                    <a:bodyPr/>
-                    <a:lstStyle/>
-                    <a:p>
-                      <a:r>
-                        <a:rPr lang="en-NZ" dirty="0" smtClean="0"/>
-                        <a:t>5</a:t>
-                      </a:r>
-                      <a:endParaRPr lang="en-NZ" dirty="0"/>
-                    </a:p>
-                  </a:txBody>
-                  <a:tcPr/>
-                </a:tc>
-                <a:tc>
-                  <a:txBody>
-                    <a:bodyPr/>
-                    <a:lstStyle/>
-                    <a:p>
-                      <a:r>
-                        <a:rPr lang="en-NZ" dirty="0" smtClean="0"/>
-                        <a:t>0</a:t>
-                      </a:r>
-                      <a:endParaRPr lang="en-NZ" dirty="0"/>
-                    </a:p>
-                  </a:txBody>
-                  <a:tcPr/>
-                </a:tc>
-                <a:tc>
-                  <a:txBody>
-                    <a:bodyPr/>
-                    <a:lstStyle/>
-                    <a:p>
-                      <a:r>
-                        <a:rPr lang="en-NZ" dirty="0" smtClean="0"/>
-                        <a:t>NA</a:t>
-                      </a:r>
-                      <a:endParaRPr lang="en-NZ" dirty="0"/>
-                    </a:p>
-                  </a:txBody>
-                  <a:tcPr/>
-                </a:tc>
-                <a:tc>
-                  <a:txBody>
-                    <a:bodyPr/>
-                    <a:lstStyle/>
-                    <a:p>
-                      <a:r>
-                        <a:rPr lang="en-NZ" dirty="0" smtClean="0"/>
-                        <a:t>0</a:t>
-                      </a:r>
-                      <a:endParaRPr lang="en-NZ" dirty="0"/>
-                    </a:p>
-                  </a:txBody>
-                  <a:tcPr/>
-                </a:tc>
-              </a:tr>
-              <a:tr h="370840">
-                <a:tc>
-                  <a:txBody>
-                    <a:bodyPr/>
-                    <a:lstStyle/>
-                    <a:p>
-                      <a:r>
-                        <a:rPr lang="en-NZ" dirty="0" smtClean="0"/>
-                        <a:t>3</a:t>
-                      </a:r>
-                      <a:endParaRPr lang="en-NZ" dirty="0"/>
-                    </a:p>
-                  </a:txBody>
-                  <a:tcPr/>
-                </a:tc>
-                <a:tc>
-                  <a:txBody>
-                    <a:bodyPr/>
-                    <a:lstStyle/>
-                    <a:p>
-                      <a:r>
-                        <a:rPr lang="en-NZ" dirty="0" smtClean="0"/>
-                        <a:t>6</a:t>
-                      </a:r>
-                      <a:endParaRPr lang="en-NZ" dirty="0"/>
-                    </a:p>
-                  </a:txBody>
-                  <a:tcPr/>
-                </a:tc>
-                <a:tc>
-                  <a:txBody>
-                    <a:bodyPr/>
-                    <a:lstStyle/>
-                    <a:p>
-                      <a:r>
-                        <a:rPr lang="en-NZ" dirty="0" smtClean="0"/>
-                        <a:t>0</a:t>
-                      </a:r>
-                      <a:endParaRPr lang="en-NZ" dirty="0"/>
-                    </a:p>
-                  </a:txBody>
-                  <a:tcPr/>
-                </a:tc>
-                <a:tc>
-                  <a:txBody>
-                    <a:bodyPr/>
-                    <a:lstStyle/>
-                    <a:p>
-                      <a:r>
-                        <a:rPr lang="en-NZ" dirty="0" smtClean="0"/>
-                        <a:t>NA</a:t>
-                      </a:r>
-                      <a:endParaRPr lang="en-NZ" dirty="0"/>
-                    </a:p>
-                  </a:txBody>
-                  <a:tcPr/>
-                </a:tc>
-                <a:tc>
-                  <a:txBody>
-                    <a:bodyPr/>
-                    <a:lstStyle/>
-                    <a:p>
-                      <a:r>
-                        <a:rPr lang="en-NZ" dirty="0" smtClean="0"/>
-                        <a:t>0</a:t>
-                      </a:r>
-                      <a:endParaRPr lang="en-NZ" dirty="0"/>
-                    </a:p>
-                  </a:txBody>
-                  <a:tcPr/>
-                </a:tc>
-              </a:tr>
-              <a:tr h="370840">
-                <a:tc>
-                  <a:txBody>
-                    <a:bodyPr/>
-                    <a:lstStyle/>
-                    <a:p>
-                      <a:r>
-                        <a:rPr lang="en-NZ" dirty="0" smtClean="0"/>
-                        <a:t>4</a:t>
-                      </a:r>
-                      <a:endParaRPr lang="en-NZ" dirty="0"/>
-                    </a:p>
-                  </a:txBody>
-                  <a:tcPr/>
-                </a:tc>
-                <a:tc>
-                  <a:txBody>
-                    <a:bodyPr/>
-                    <a:lstStyle/>
-                    <a:p>
-                      <a:r>
-                        <a:rPr lang="en-NZ" dirty="0" smtClean="0"/>
-                        <a:t>2</a:t>
-                      </a:r>
-                      <a:endParaRPr lang="en-NZ" dirty="0"/>
-                    </a:p>
-                  </a:txBody>
-                  <a:tcPr/>
-                </a:tc>
-                <a:tc>
-                  <a:txBody>
-                    <a:bodyPr/>
-                    <a:lstStyle/>
-                    <a:p>
-                      <a:r>
-                        <a:rPr lang="en-NZ" dirty="0" smtClean="0"/>
-                        <a:t>0</a:t>
-                      </a:r>
-                      <a:endParaRPr lang="en-NZ" dirty="0"/>
-                    </a:p>
-                  </a:txBody>
-                  <a:tcPr/>
-                </a:tc>
-                <a:tc>
-                  <a:txBody>
-                    <a:bodyPr/>
-                    <a:lstStyle/>
-                    <a:p>
-                      <a:r>
-                        <a:rPr lang="en-NZ" dirty="0" smtClean="0"/>
-                        <a:t>NA</a:t>
-                      </a:r>
-                      <a:endParaRPr lang="en-NZ" dirty="0"/>
-                    </a:p>
-                  </a:txBody>
-                  <a:tcPr/>
-                </a:tc>
-                <a:tc>
-                  <a:txBody>
-                    <a:bodyPr/>
-                    <a:lstStyle/>
-                    <a:p>
-                      <a:r>
-                        <a:rPr lang="en-NZ" dirty="0" smtClean="0"/>
-                        <a:t>0</a:t>
-                      </a:r>
-                      <a:endParaRPr lang="en-NZ" dirty="0"/>
-                    </a:p>
-                  </a:txBody>
-                  <a:tcPr/>
-                </a:tc>
-              </a:tr>
-              <a:tr h="370840">
-                <a:tc>
-                  <a:txBody>
-                    <a:bodyPr/>
-                    <a:lstStyle/>
-                    <a:p>
-                      <a:r>
-                        <a:rPr lang="en-NZ" dirty="0" smtClean="0"/>
-                        <a:t>5</a:t>
-                      </a:r>
-                      <a:endParaRPr lang="en-NZ" dirty="0"/>
-                    </a:p>
-                  </a:txBody>
-                  <a:tcPr/>
-                </a:tc>
-                <a:tc>
-                  <a:txBody>
-                    <a:bodyPr/>
-                    <a:lstStyle/>
-                    <a:p>
-                      <a:r>
-                        <a:rPr lang="en-NZ" dirty="0" smtClean="0"/>
-                        <a:t>4</a:t>
-                      </a:r>
-                      <a:endParaRPr lang="en-NZ" dirty="0"/>
-                    </a:p>
-                  </a:txBody>
-                  <a:tcPr/>
-                </a:tc>
-                <a:tc>
-                  <a:txBody>
-                    <a:bodyPr/>
-                    <a:lstStyle/>
-                    <a:p>
-                      <a:r>
-                        <a:rPr lang="en-NZ" dirty="0" smtClean="0"/>
-                        <a:t>0</a:t>
-                      </a:r>
-                      <a:endParaRPr lang="en-NZ" dirty="0"/>
-                    </a:p>
-                  </a:txBody>
-                  <a:tcPr/>
-                </a:tc>
-                <a:tc>
-                  <a:txBody>
-                    <a:bodyPr/>
-                    <a:lstStyle/>
-                    <a:p>
-                      <a:r>
-                        <a:rPr lang="en-NZ" dirty="0" smtClean="0"/>
-                        <a:t>NA</a:t>
-                      </a:r>
-                      <a:endParaRPr lang="en-NZ" dirty="0"/>
-                    </a:p>
-                  </a:txBody>
-                  <a:tcPr/>
-                </a:tc>
-                <a:tc>
-                  <a:txBody>
-                    <a:bodyPr/>
-                    <a:lstStyle/>
-                    <a:p>
-                      <a:r>
-                        <a:rPr lang="en-NZ" dirty="0" smtClean="0"/>
-                        <a:t>0</a:t>
-                      </a:r>
-                      <a:endParaRPr lang="en-NZ" dirty="0"/>
-                    </a:p>
-                  </a:txBody>
-                  <a:tcPr/>
-                </a:tc>
-              </a:tr>
-            </a:tbl>
-          </a:graphicData>
-        </a:graphic>
-      </p:graphicFrame>
     </p:spTree>
   </p:cSld>
   <p:clrMapOvr>
@@ -10760,162 +10860,480 @@
         </p:nvSpPr>
         <p:spPr/>
         <p:txBody>
-          <a:bodyPr>
-            <a:normAutofit/>
-          </a:bodyPr>
+          <a:bodyPr/>
           <a:lstStyle/>
           <a:p>
             <a:r>
-              <a:rPr lang="en-NZ" dirty="0" smtClean="0"/>
-              <a:t>The master </a:t>
-            </a:r>
-            <a:r>
               <a:rPr lang="en-NZ" dirty="0" err="1" smtClean="0"/>
-              <a:t>simframe</a:t>
+              <a:t>Simframe</a:t>
             </a:r>
             <a:endParaRPr lang="en-NZ" dirty="0"/>
           </a:p>
         </p:txBody>
       </p:sp>
-      <p:sp>
-        <p:nvSpPr>
-          <p:cNvPr id="3" name="Content Placeholder 2"/>
-          <p:cNvSpPr>
-            <a:spLocks noGrp="1"/>
-          </p:cNvSpPr>
+      <p:graphicFrame>
+        <p:nvGraphicFramePr>
+          <p:cNvPr id="4" name="Content Placeholder 3"/>
+          <p:cNvGraphicFramePr>
+            <a:graphicFrameLocks noGrp="1"/>
+          </p:cNvGraphicFramePr>
           <p:nvPr>
             <p:ph idx="1"/>
           </p:nvPr>
-        </p:nvSpPr>
-        <p:spPr/>
-        <p:txBody>
-          <a:bodyPr>
-            <a:normAutofit fontScale="92500" lnSpcReduction="20000"/>
-          </a:bodyPr>
-          <a:lstStyle/>
-          <a:p>
-            <a:r>
-              <a:rPr lang="en-NZ" dirty="0" smtClean="0"/>
-              <a:t>The master </a:t>
-            </a:r>
-            <a:r>
-              <a:rPr lang="en-NZ" dirty="0" err="1" smtClean="0"/>
-              <a:t>simframe</a:t>
-            </a:r>
-            <a:r>
-              <a:rPr lang="en-NZ" dirty="0" smtClean="0"/>
-              <a:t> is initialised from a </a:t>
-            </a:r>
-            <a:r>
-              <a:rPr lang="en-NZ" dirty="0" err="1" smtClean="0"/>
-              <a:t>simframe</a:t>
-            </a:r>
-            <a:r>
-              <a:rPr lang="en-NZ" dirty="0" smtClean="0"/>
-              <a:t> definition file.</a:t>
-            </a:r>
-          </a:p>
-          <a:p>
-            <a:r>
-              <a:rPr lang="en-NZ" dirty="0" smtClean="0"/>
-              <a:t>Each </a:t>
-            </a:r>
-            <a:r>
-              <a:rPr lang="en-NZ" dirty="0" err="1" smtClean="0"/>
-              <a:t>simframe</a:t>
-            </a:r>
-            <a:r>
-              <a:rPr lang="en-NZ" dirty="0" smtClean="0"/>
-              <a:t> variable is populated with initial values, as specified by the definition file.</a:t>
-            </a:r>
-          </a:p>
-          <a:p>
-            <a:r>
-              <a:rPr lang="en-NZ" dirty="0" smtClean="0"/>
-              <a:t>Initial values may come from the global environment, or from a supplied </a:t>
-            </a:r>
-            <a:r>
-              <a:rPr lang="en-NZ" dirty="0" err="1" smtClean="0"/>
-              <a:t>dataframe</a:t>
-            </a:r>
-            <a:r>
-              <a:rPr lang="en-NZ" dirty="0" smtClean="0"/>
-              <a:t>, </a:t>
-            </a:r>
-            <a:r>
-              <a:rPr lang="en-NZ" dirty="0" err="1" smtClean="0"/>
-              <a:t>eg</a:t>
-            </a:r>
-            <a:r>
-              <a:rPr lang="en-NZ" dirty="0" smtClean="0"/>
-              <a:t>: a </a:t>
-            </a:r>
-            <a:r>
-              <a:rPr lang="en-NZ" dirty="0" err="1" smtClean="0"/>
-              <a:t>dataframe</a:t>
-            </a:r>
-            <a:r>
-              <a:rPr lang="en-NZ" dirty="0" smtClean="0"/>
-              <a:t> loaded from a base file</a:t>
-            </a:r>
-          </a:p>
-          <a:p>
-            <a:r>
-              <a:rPr lang="en-NZ" dirty="0" smtClean="0"/>
-              <a:t>The master </a:t>
-            </a:r>
-            <a:r>
-              <a:rPr lang="en-NZ" dirty="0" err="1" smtClean="0"/>
-              <a:t>simframe</a:t>
-            </a:r>
-            <a:r>
-              <a:rPr lang="en-NZ" dirty="0" smtClean="0"/>
-              <a:t> is typically stored in the global variable </a:t>
-            </a:r>
-            <a:r>
-              <a:rPr lang="en-NZ" dirty="0" err="1" smtClean="0">
-                <a:latin typeface="Courier New" pitchFamily="49" charset="0"/>
-                <a:cs typeface="Courier New" pitchFamily="49" charset="0"/>
-              </a:rPr>
-              <a:t>simframe.master</a:t>
-            </a:r>
-            <a:endParaRPr lang="en-NZ" dirty="0" smtClean="0">
-              <a:latin typeface="Courier New" pitchFamily="49" charset="0"/>
-              <a:cs typeface="Courier New" pitchFamily="49" charset="0"/>
-            </a:endParaRPr>
-          </a:p>
-          <a:p>
-            <a:r>
-              <a:rPr lang="en-NZ" dirty="0" smtClean="0"/>
-              <a:t>After loading the master </a:t>
-            </a:r>
-            <a:r>
-              <a:rPr lang="en-NZ" dirty="0" err="1" smtClean="0"/>
-              <a:t>simframe</a:t>
-            </a:r>
-            <a:r>
-              <a:rPr lang="en-NZ" dirty="0" smtClean="0"/>
-              <a:t> is not modified</a:t>
-            </a:r>
-            <a:endParaRPr lang="en-NZ" dirty="0" smtClean="0">
-              <a:latin typeface="Courier New" pitchFamily="49" charset="0"/>
-              <a:cs typeface="Courier New" pitchFamily="49" charset="0"/>
-            </a:endParaRPr>
-          </a:p>
-          <a:p>
-            <a:endParaRPr lang="en-NZ" dirty="0" smtClean="0">
-              <a:latin typeface="Courier New" pitchFamily="49" charset="0"/>
-              <a:cs typeface="Courier New" pitchFamily="49" charset="0"/>
-            </a:endParaRPr>
-          </a:p>
-          <a:p>
-            <a:endParaRPr lang="en-NZ" dirty="0" smtClean="0"/>
-          </a:p>
-          <a:p>
-            <a:endParaRPr lang="en-NZ" dirty="0"/>
-          </a:p>
-        </p:txBody>
-      </p:sp>
+        </p:nvGraphicFramePr>
+        <p:xfrm>
+          <a:off x="1763688" y="1628800"/>
+          <a:ext cx="5606836" cy="2225040"/>
+        </p:xfrm>
+        <a:graphic>
+          <a:graphicData uri="http://schemas.openxmlformats.org/drawingml/2006/table">
+            <a:tbl>
+              <a:tblPr firstRow="1" bandRow="1">
+                <a:tableStyleId>{5C22544A-7EE6-4342-B048-85BDC9FD1C3A}</a:tableStyleId>
+              </a:tblPr>
+              <a:tblGrid>
+                <a:gridCol w="514400"/>
+                <a:gridCol w="792088"/>
+                <a:gridCol w="863918"/>
+                <a:gridCol w="1790510"/>
+                <a:gridCol w="1645920"/>
+              </a:tblGrid>
+              <a:tr h="370840">
+                <a:tc>
+                  <a:txBody>
+                    <a:bodyPr/>
+                    <a:lstStyle/>
+                    <a:p>
+                      <a:r>
+                        <a:rPr lang="en-NZ" dirty="0" smtClean="0"/>
+                        <a:t>ID</a:t>
+                      </a:r>
+                      <a:endParaRPr lang="en-NZ" dirty="0"/>
+                    </a:p>
+                  </a:txBody>
+                  <a:tcPr/>
+                </a:tc>
+                <a:tc>
+                  <a:txBody>
+                    <a:bodyPr/>
+                    <a:lstStyle/>
+                    <a:p>
+                      <a:r>
+                        <a:rPr lang="en-NZ" dirty="0" smtClean="0"/>
+                        <a:t>Age</a:t>
+                      </a:r>
+                      <a:endParaRPr lang="en-NZ" dirty="0"/>
+                    </a:p>
+                  </a:txBody>
+                  <a:tcPr/>
+                </a:tc>
+                <a:tc>
+                  <a:txBody>
+                    <a:bodyPr/>
+                    <a:lstStyle/>
+                    <a:p>
+                      <a:r>
+                        <a:rPr lang="en-NZ" dirty="0" smtClean="0"/>
+                        <a:t>Health</a:t>
+                      </a:r>
+                      <a:endParaRPr lang="en-NZ" dirty="0"/>
+                    </a:p>
+                  </a:txBody>
+                  <a:tcPr/>
+                </a:tc>
+                <a:tc>
+                  <a:txBody>
+                    <a:bodyPr/>
+                    <a:lstStyle/>
+                    <a:p>
+                      <a:r>
+                        <a:rPr lang="en-NZ" dirty="0" err="1" smtClean="0"/>
+                        <a:t>Health_previous</a:t>
+                      </a:r>
+                      <a:endParaRPr lang="en-NZ" dirty="0"/>
+                    </a:p>
+                  </a:txBody>
+                  <a:tcPr/>
+                </a:tc>
+                <a:tc>
+                  <a:txBody>
+                    <a:bodyPr/>
+                    <a:lstStyle/>
+                    <a:p>
+                      <a:r>
+                        <a:rPr lang="en-NZ" dirty="0" smtClean="0"/>
+                        <a:t>Earnings</a:t>
+                      </a:r>
+                      <a:endParaRPr lang="en-NZ" dirty="0"/>
+                    </a:p>
+                  </a:txBody>
+                  <a:tcPr/>
+                </a:tc>
+              </a:tr>
+              <a:tr h="370840">
+                <a:tc>
+                  <a:txBody>
+                    <a:bodyPr/>
+                    <a:lstStyle/>
+                    <a:p>
+                      <a:r>
+                        <a:rPr lang="en-NZ" dirty="0" smtClean="0"/>
+                        <a:t>1</a:t>
+                      </a:r>
+                      <a:endParaRPr lang="en-NZ" dirty="0"/>
+                    </a:p>
+                  </a:txBody>
+                  <a:tcPr/>
+                </a:tc>
+                <a:tc>
+                  <a:txBody>
+                    <a:bodyPr/>
+                    <a:lstStyle/>
+                    <a:p>
+                      <a:r>
+                        <a:rPr lang="en-NZ" dirty="0" smtClean="0"/>
+                        <a:t>2</a:t>
+                      </a:r>
+                      <a:endParaRPr lang="en-NZ" dirty="0"/>
+                    </a:p>
+                  </a:txBody>
+                  <a:tcPr/>
+                </a:tc>
+                <a:tc>
+                  <a:txBody>
+                    <a:bodyPr/>
+                    <a:lstStyle/>
+                    <a:p>
+                      <a:r>
+                        <a:rPr lang="en-NZ" dirty="0" smtClean="0"/>
+                        <a:t>0</a:t>
+                      </a:r>
+                      <a:endParaRPr lang="en-NZ" dirty="0"/>
+                    </a:p>
+                  </a:txBody>
+                  <a:tcPr/>
+                </a:tc>
+                <a:tc>
+                  <a:txBody>
+                    <a:bodyPr/>
+                    <a:lstStyle/>
+                    <a:p>
+                      <a:r>
+                        <a:rPr lang="en-NZ" dirty="0" smtClean="0"/>
+                        <a:t>NA</a:t>
+                      </a:r>
+                      <a:endParaRPr lang="en-NZ" dirty="0"/>
+                    </a:p>
+                  </a:txBody>
+                  <a:tcPr/>
+                </a:tc>
+                <a:tc>
+                  <a:txBody>
+                    <a:bodyPr/>
+                    <a:lstStyle/>
+                    <a:p>
+                      <a:r>
+                        <a:rPr lang="en-NZ" dirty="0" smtClean="0"/>
+                        <a:t>0</a:t>
+                      </a:r>
+                      <a:endParaRPr lang="en-NZ" dirty="0"/>
+                    </a:p>
+                  </a:txBody>
+                  <a:tcPr/>
+                </a:tc>
+              </a:tr>
+              <a:tr h="370840">
+                <a:tc>
+                  <a:txBody>
+                    <a:bodyPr/>
+                    <a:lstStyle/>
+                    <a:p>
+                      <a:r>
+                        <a:rPr lang="en-NZ" dirty="0" smtClean="0"/>
+                        <a:t>2</a:t>
+                      </a:r>
+                      <a:endParaRPr lang="en-NZ" dirty="0"/>
+                    </a:p>
+                  </a:txBody>
+                  <a:tcPr/>
+                </a:tc>
+                <a:tc>
+                  <a:txBody>
+                    <a:bodyPr/>
+                    <a:lstStyle/>
+                    <a:p>
+                      <a:r>
+                        <a:rPr lang="en-NZ" dirty="0" smtClean="0"/>
+                        <a:t>5</a:t>
+                      </a:r>
+                      <a:endParaRPr lang="en-NZ" dirty="0"/>
+                    </a:p>
+                  </a:txBody>
+                  <a:tcPr/>
+                </a:tc>
+                <a:tc>
+                  <a:txBody>
+                    <a:bodyPr/>
+                    <a:lstStyle/>
+                    <a:p>
+                      <a:r>
+                        <a:rPr lang="en-NZ" dirty="0" smtClean="0"/>
+                        <a:t>0</a:t>
+                      </a:r>
+                      <a:endParaRPr lang="en-NZ" dirty="0"/>
+                    </a:p>
+                  </a:txBody>
+                  <a:tcPr/>
+                </a:tc>
+                <a:tc>
+                  <a:txBody>
+                    <a:bodyPr/>
+                    <a:lstStyle/>
+                    <a:p>
+                      <a:r>
+                        <a:rPr lang="en-NZ" dirty="0" smtClean="0"/>
+                        <a:t>NA</a:t>
+                      </a:r>
+                      <a:endParaRPr lang="en-NZ" dirty="0"/>
+                    </a:p>
+                  </a:txBody>
+                  <a:tcPr/>
+                </a:tc>
+                <a:tc>
+                  <a:txBody>
+                    <a:bodyPr/>
+                    <a:lstStyle/>
+                    <a:p>
+                      <a:r>
+                        <a:rPr lang="en-NZ" dirty="0" smtClean="0"/>
+                        <a:t>0</a:t>
+                      </a:r>
+                      <a:endParaRPr lang="en-NZ" dirty="0"/>
+                    </a:p>
+                  </a:txBody>
+                  <a:tcPr/>
+                </a:tc>
+              </a:tr>
+              <a:tr h="370840">
+                <a:tc>
+                  <a:txBody>
+                    <a:bodyPr/>
+                    <a:lstStyle/>
+                    <a:p>
+                      <a:r>
+                        <a:rPr lang="en-NZ" dirty="0" smtClean="0"/>
+                        <a:t>3</a:t>
+                      </a:r>
+                      <a:endParaRPr lang="en-NZ" dirty="0"/>
+                    </a:p>
+                  </a:txBody>
+                  <a:tcPr/>
+                </a:tc>
+                <a:tc>
+                  <a:txBody>
+                    <a:bodyPr/>
+                    <a:lstStyle/>
+                    <a:p>
+                      <a:r>
+                        <a:rPr lang="en-NZ" dirty="0" smtClean="0"/>
+                        <a:t>6</a:t>
+                      </a:r>
+                      <a:endParaRPr lang="en-NZ" dirty="0"/>
+                    </a:p>
+                  </a:txBody>
+                  <a:tcPr/>
+                </a:tc>
+                <a:tc>
+                  <a:txBody>
+                    <a:bodyPr/>
+                    <a:lstStyle/>
+                    <a:p>
+                      <a:r>
+                        <a:rPr lang="en-NZ" dirty="0" smtClean="0"/>
+                        <a:t>0</a:t>
+                      </a:r>
+                      <a:endParaRPr lang="en-NZ" dirty="0"/>
+                    </a:p>
+                  </a:txBody>
+                  <a:tcPr/>
+                </a:tc>
+                <a:tc>
+                  <a:txBody>
+                    <a:bodyPr/>
+                    <a:lstStyle/>
+                    <a:p>
+                      <a:r>
+                        <a:rPr lang="en-NZ" dirty="0" smtClean="0"/>
+                        <a:t>NA</a:t>
+                      </a:r>
+                      <a:endParaRPr lang="en-NZ" dirty="0"/>
+                    </a:p>
+                  </a:txBody>
+                  <a:tcPr/>
+                </a:tc>
+                <a:tc>
+                  <a:txBody>
+                    <a:bodyPr/>
+                    <a:lstStyle/>
+                    <a:p>
+                      <a:r>
+                        <a:rPr lang="en-NZ" dirty="0" smtClean="0"/>
+                        <a:t>0</a:t>
+                      </a:r>
+                      <a:endParaRPr lang="en-NZ" dirty="0"/>
+                    </a:p>
+                  </a:txBody>
+                  <a:tcPr/>
+                </a:tc>
+              </a:tr>
+              <a:tr h="370840">
+                <a:tc>
+                  <a:txBody>
+                    <a:bodyPr/>
+                    <a:lstStyle/>
+                    <a:p>
+                      <a:r>
+                        <a:rPr lang="en-NZ" dirty="0" smtClean="0"/>
+                        <a:t>4</a:t>
+                      </a:r>
+                      <a:endParaRPr lang="en-NZ" dirty="0"/>
+                    </a:p>
+                  </a:txBody>
+                  <a:tcPr/>
+                </a:tc>
+                <a:tc>
+                  <a:txBody>
+                    <a:bodyPr/>
+                    <a:lstStyle/>
+                    <a:p>
+                      <a:r>
+                        <a:rPr lang="en-NZ" dirty="0" smtClean="0"/>
+                        <a:t>2</a:t>
+                      </a:r>
+                      <a:endParaRPr lang="en-NZ" dirty="0"/>
+                    </a:p>
+                  </a:txBody>
+                  <a:tcPr/>
+                </a:tc>
+                <a:tc>
+                  <a:txBody>
+                    <a:bodyPr/>
+                    <a:lstStyle/>
+                    <a:p>
+                      <a:r>
+                        <a:rPr lang="en-NZ" dirty="0" smtClean="0"/>
+                        <a:t>0</a:t>
+                      </a:r>
+                      <a:endParaRPr lang="en-NZ" dirty="0"/>
+                    </a:p>
+                  </a:txBody>
+                  <a:tcPr/>
+                </a:tc>
+                <a:tc>
+                  <a:txBody>
+                    <a:bodyPr/>
+                    <a:lstStyle/>
+                    <a:p>
+                      <a:r>
+                        <a:rPr lang="en-NZ" dirty="0" smtClean="0"/>
+                        <a:t>NA</a:t>
+                      </a:r>
+                      <a:endParaRPr lang="en-NZ" dirty="0"/>
+                    </a:p>
+                  </a:txBody>
+                  <a:tcPr/>
+                </a:tc>
+                <a:tc>
+                  <a:txBody>
+                    <a:bodyPr/>
+                    <a:lstStyle/>
+                    <a:p>
+                      <a:r>
+                        <a:rPr lang="en-NZ" dirty="0" smtClean="0"/>
+                        <a:t>0</a:t>
+                      </a:r>
+                      <a:endParaRPr lang="en-NZ" dirty="0"/>
+                    </a:p>
+                  </a:txBody>
+                  <a:tcPr/>
+                </a:tc>
+              </a:tr>
+              <a:tr h="370840">
+                <a:tc>
+                  <a:txBody>
+                    <a:bodyPr/>
+                    <a:lstStyle/>
+                    <a:p>
+                      <a:r>
+                        <a:rPr lang="en-NZ" dirty="0" smtClean="0"/>
+                        <a:t>5</a:t>
+                      </a:r>
+                      <a:endParaRPr lang="en-NZ" dirty="0"/>
+                    </a:p>
+                  </a:txBody>
+                  <a:tcPr/>
+                </a:tc>
+                <a:tc>
+                  <a:txBody>
+                    <a:bodyPr/>
+                    <a:lstStyle/>
+                    <a:p>
+                      <a:r>
+                        <a:rPr lang="en-NZ" dirty="0" smtClean="0"/>
+                        <a:t>4</a:t>
+                      </a:r>
+                      <a:endParaRPr lang="en-NZ" dirty="0"/>
+                    </a:p>
+                  </a:txBody>
+                  <a:tcPr/>
+                </a:tc>
+                <a:tc>
+                  <a:txBody>
+                    <a:bodyPr/>
+                    <a:lstStyle/>
+                    <a:p>
+                      <a:r>
+                        <a:rPr lang="en-NZ" dirty="0" smtClean="0"/>
+                        <a:t>0</a:t>
+                      </a:r>
+                      <a:endParaRPr lang="en-NZ" dirty="0"/>
+                    </a:p>
+                  </a:txBody>
+                  <a:tcPr/>
+                </a:tc>
+                <a:tc>
+                  <a:txBody>
+                    <a:bodyPr/>
+                    <a:lstStyle/>
+                    <a:p>
+                      <a:r>
+                        <a:rPr lang="en-NZ" dirty="0" smtClean="0"/>
+                        <a:t>NA</a:t>
+                      </a:r>
+                      <a:endParaRPr lang="en-NZ" dirty="0"/>
+                    </a:p>
+                  </a:txBody>
+                  <a:tcPr/>
+                </a:tc>
+                <a:tc>
+                  <a:txBody>
+                    <a:bodyPr/>
+                    <a:lstStyle/>
+                    <a:p>
+                      <a:r>
+                        <a:rPr lang="en-NZ" dirty="0" smtClean="0"/>
+                        <a:t>0</a:t>
+                      </a:r>
+                      <a:endParaRPr lang="en-NZ" dirty="0"/>
+                    </a:p>
+                  </a:txBody>
+                  <a:tcPr/>
+                </a:tc>
+              </a:tr>
+            </a:tbl>
+          </a:graphicData>
+        </a:graphic>
+      </p:graphicFrame>
     </p:spTree>
   </p:cSld>
   <p:clrMapOvr>
@@ -10953,16 +11371,18 @@
         </p:nvSpPr>
         <p:spPr/>
         <p:txBody>
-          <a:bodyPr/>
+          <a:bodyPr>
+            <a:normAutofit/>
+          </a:bodyPr>
           <a:lstStyle/>
           <a:p>
             <a:r>
+              <a:rPr lang="en-NZ" dirty="0" smtClean="0"/>
+              <a:t>The master </a:t>
+            </a:r>
+            <a:r>
               <a:rPr lang="en-NZ" dirty="0" err="1" smtClean="0"/>
-              <a:t>Simframe</a:t>
-            </a:r>
-            <a:r>
-              <a:rPr lang="en-NZ" dirty="0" smtClean="0"/>
-              <a:t> definition file</a:t>
+              <a:t>simframe</a:t>
             </a:r>
             <a:endParaRPr lang="en-NZ" dirty="0"/>
           </a:p>
@@ -10981,159 +11401,129 @@
         <p:spPr/>
         <p:txBody>
           <a:bodyPr>
-            <a:normAutofit fontScale="70000" lnSpcReduction="20000"/>
+            <a:normAutofit fontScale="92500" lnSpcReduction="20000"/>
           </a:bodyPr>
           <a:lstStyle/>
           <a:p>
             <a:r>
-              <a:rPr lang="en-NZ" dirty="0" err="1" smtClean="0"/>
-              <a:t>Varname</a:t>
-            </a:r>
-            <a:r>
               <a:rPr lang="en-NZ" dirty="0" smtClean="0"/>
-              <a:t>: </a:t>
-            </a:r>
-          </a:p>
-          <a:p>
-            <a:pPr lvl="1"/>
-            <a:r>
-              <a:rPr lang="en-NZ" dirty="0" smtClean="0"/>
-              <a:t>the name of a variable in the </a:t>
+              <a:t>The master </a:t>
             </a:r>
             <a:r>
               <a:rPr lang="en-NZ" dirty="0" err="1" smtClean="0"/>
               <a:t>simframe</a:t>
             </a:r>
+            <a:r>
+              <a:rPr lang="en-NZ" dirty="0" smtClean="0"/>
+              <a:t> is initialised from a </a:t>
+            </a:r>
+            <a:r>
+              <a:rPr lang="en-NZ" dirty="0" err="1" smtClean="0"/>
+              <a:t>simframe</a:t>
+            </a:r>
+            <a:r>
+              <a:rPr lang="en-NZ" dirty="0" smtClean="0"/>
+              <a:t> definition file.</a:t>
+            </a:r>
+          </a:p>
+          <a:p>
+            <a:r>
+              <a:rPr lang="en-NZ" dirty="0" smtClean="0"/>
+              <a:t>Each </a:t>
+            </a:r>
+            <a:r>
+              <a:rPr lang="en-NZ" dirty="0" err="1" smtClean="0"/>
+              <a:t>simframe</a:t>
+            </a:r>
+            <a:r>
+              <a:rPr lang="en-NZ" dirty="0" smtClean="0"/>
+              <a:t> variable is populated with initial values, as specified by the definition file.</a:t>
+            </a:r>
+          </a:p>
+          <a:p>
+            <a:r>
+              <a:rPr lang="en-NZ" dirty="0" smtClean="0"/>
+              <a:t>Initial values may come from the global environment, or from a supplied </a:t>
+            </a:r>
+            <a:r>
+              <a:rPr lang="en-NZ" dirty="0" err="1" smtClean="0"/>
+              <a:t>dataframe</a:t>
+            </a:r>
+            <a:r>
+              <a:rPr lang="en-NZ" dirty="0" smtClean="0"/>
+              <a:t>, </a:t>
+            </a:r>
+            <a:r>
+              <a:rPr lang="en-NZ" dirty="0" err="1" smtClean="0"/>
+              <a:t>eg</a:t>
+            </a:r>
+            <a:r>
+              <a:rPr lang="en-NZ" dirty="0" smtClean="0"/>
+              <a:t>: a </a:t>
+            </a:r>
+            <a:r>
+              <a:rPr lang="en-NZ" dirty="0" err="1" smtClean="0"/>
+              <a:t>dataframe</a:t>
+            </a:r>
+            <a:r>
+              <a:rPr lang="en-NZ" dirty="0" smtClean="0"/>
+              <a:t> loaded from a base file</a:t>
+            </a:r>
+          </a:p>
+          <a:p>
+            <a:r>
+              <a:rPr lang="en-NZ" dirty="0" smtClean="0"/>
+              <a:t>The master </a:t>
+            </a:r>
+            <a:r>
+              <a:rPr lang="en-NZ" dirty="0" err="1" smtClean="0"/>
+              <a:t>simframe</a:t>
+            </a:r>
+            <a:r>
+              <a:rPr lang="en-NZ" dirty="0" smtClean="0"/>
+              <a:t> is typically stored in the global variable </a:t>
+            </a:r>
+            <a:r>
+              <a:rPr lang="en-NZ" dirty="0" err="1" smtClean="0">
+                <a:latin typeface="Courier New" pitchFamily="49" charset="0"/>
+                <a:cs typeface="Courier New" pitchFamily="49" charset="0"/>
+              </a:rPr>
+              <a:t>simframe.master</a:t>
+            </a:r>
+            <a:endParaRPr lang="en-NZ" dirty="0" smtClean="0">
+              <a:latin typeface="Courier New" pitchFamily="49" charset="0"/>
+              <a:cs typeface="Courier New" pitchFamily="49" charset="0"/>
+            </a:endParaRPr>
+          </a:p>
+          <a:p>
+            <a:r>
+              <a:rPr lang="en-NZ" dirty="0" smtClean="0"/>
+              <a:t>After loading the master </a:t>
+            </a:r>
+            <a:r>
+              <a:rPr lang="en-NZ" dirty="0" err="1" smtClean="0"/>
+              <a:t>simframe</a:t>
+            </a:r>
+            <a:r>
+              <a:rPr lang="en-NZ" dirty="0" smtClean="0"/>
+              <a:t> is not modified</a:t>
+            </a:r>
+            <a:endParaRPr lang="en-NZ" dirty="0" smtClean="0">
+              <a:latin typeface="Courier New" pitchFamily="49" charset="0"/>
+              <a:cs typeface="Courier New" pitchFamily="49" charset="0"/>
+            </a:endParaRPr>
+          </a:p>
+          <a:p>
+            <a:endParaRPr lang="en-NZ" dirty="0" smtClean="0">
+              <a:latin typeface="Courier New" pitchFamily="49" charset="0"/>
+              <a:cs typeface="Courier New" pitchFamily="49" charset="0"/>
+            </a:endParaRPr>
+          </a:p>
+          <a:p>
             <a:endParaRPr lang="en-NZ" dirty="0" smtClean="0"/>
           </a:p>
           <a:p>
-            <a:r>
-              <a:rPr lang="en-NZ" dirty="0" err="1" smtClean="0"/>
-              <a:t>Previous_var</a:t>
-            </a:r>
-            <a:endParaRPr lang="en-NZ" dirty="0" smtClean="0"/>
-          </a:p>
-          <a:p>
-            <a:pPr lvl="1"/>
-            <a:r>
-              <a:rPr lang="en-NZ" dirty="0" smtClean="0"/>
-              <a:t>the </a:t>
-            </a:r>
-            <a:r>
-              <a:rPr lang="en-NZ" dirty="0"/>
-              <a:t>name of a variable in which to store the current value in at the </a:t>
-            </a:r>
-            <a:r>
-              <a:rPr lang="en-NZ" dirty="0" smtClean="0"/>
-              <a:t>beginning of </a:t>
-            </a:r>
-            <a:r>
-              <a:rPr lang="en-NZ" dirty="0"/>
-              <a:t>each iteration (</a:t>
-            </a:r>
-            <a:r>
-              <a:rPr lang="en-NZ" dirty="0" err="1"/>
-              <a:t>i.e</a:t>
-            </a:r>
-            <a:r>
-              <a:rPr lang="en-NZ" dirty="0"/>
-              <a:t>: before it's transformed</a:t>
-            </a:r>
-            <a:r>
-              <a:rPr lang="en-NZ" dirty="0" smtClean="0"/>
-              <a:t>).</a:t>
-            </a:r>
-          </a:p>
-          <a:p>
-            <a:pPr lvl="1"/>
-            <a:r>
-              <a:rPr lang="en-NZ" dirty="0" smtClean="0"/>
-              <a:t>Optional </a:t>
-            </a:r>
-            <a:r>
-              <a:rPr lang="en-NZ" dirty="0"/>
-              <a:t>- for models that require previous state</a:t>
-            </a:r>
-            <a:r>
-              <a:rPr lang="en-NZ" dirty="0" smtClean="0"/>
-              <a:t>.</a:t>
-            </a:r>
             <a:endParaRPr lang="en-NZ" dirty="0"/>
-          </a:p>
-          <a:p>
-            <a:r>
-              <a:rPr lang="en-NZ" dirty="0" err="1" smtClean="0"/>
-              <a:t>Initial_value</a:t>
-            </a:r>
-            <a:endParaRPr lang="en-NZ" dirty="0" smtClean="0"/>
-          </a:p>
-          <a:p>
-            <a:pPr lvl="1"/>
-            <a:r>
-              <a:rPr lang="en-NZ" dirty="0"/>
-              <a:t>an expression that generates the initial value of the variable</a:t>
-            </a:r>
-            <a:r>
-              <a:rPr lang="en-NZ" dirty="0" smtClean="0"/>
-              <a:t>. Typically this expression will reference values in a previously loaded </a:t>
-            </a:r>
-            <a:r>
-              <a:rPr lang="en-NZ" dirty="0" err="1" smtClean="0"/>
-              <a:t>basefile</a:t>
-            </a:r>
-            <a:r>
-              <a:rPr lang="en-NZ" dirty="0" smtClean="0"/>
-              <a:t>.</a:t>
-            </a:r>
-          </a:p>
-          <a:p>
-            <a:r>
-              <a:rPr lang="en-NZ" dirty="0" err="1" smtClean="0"/>
-              <a:t>Outcome_type</a:t>
-            </a:r>
-            <a:endParaRPr lang="en-NZ" dirty="0" smtClean="0"/>
-          </a:p>
-          <a:p>
-            <a:pPr lvl="1"/>
-            <a:r>
-              <a:rPr lang="en-NZ" dirty="0"/>
-              <a:t>i</a:t>
-            </a:r>
-            <a:r>
-              <a:rPr lang="en-NZ" dirty="0" smtClean="0"/>
-              <a:t>f specified, indicates this is an outcome variable and indicates its type which is one of “categorical” or “continuous”</a:t>
-            </a:r>
-          </a:p>
-          <a:p>
-            <a:r>
-              <a:rPr lang="en-NZ" dirty="0" err="1" smtClean="0"/>
-              <a:t>Outcome_module</a:t>
-            </a:r>
-            <a:endParaRPr lang="en-NZ" dirty="0" smtClean="0"/>
-          </a:p>
-          <a:p>
-            <a:pPr lvl="1"/>
-            <a:r>
-              <a:rPr lang="en-NZ" dirty="0"/>
-              <a:t>if specified, indicates the </a:t>
-            </a:r>
-            <a:r>
-              <a:rPr lang="en-NZ" dirty="0" err="1" smtClean="0"/>
-              <a:t>Simmodule</a:t>
-            </a:r>
-            <a:r>
-              <a:rPr lang="en-NZ" dirty="0" smtClean="0"/>
-              <a:t> </a:t>
-            </a:r>
-            <a:r>
-              <a:rPr lang="en-NZ" dirty="0"/>
-              <a:t>this outcome variable belongs to</a:t>
-            </a:r>
-            <a:endParaRPr lang="en-NZ" dirty="0" smtClean="0"/>
-          </a:p>
-          <a:p>
-            <a:pPr lvl="1"/>
-            <a:endParaRPr lang="en-NZ" dirty="0" smtClean="0"/>
           </a:p>
         </p:txBody>
       </p:sp>
@@ -11189,369 +11579,175 @@
           </a:p>
         </p:txBody>
       </p:sp>
-      <p:graphicFrame>
-        <p:nvGraphicFramePr>
-          <p:cNvPr id="4" name="Content Placeholder 3"/>
-          <p:cNvGraphicFramePr>
-            <a:graphicFrameLocks noGrp="1"/>
-          </p:cNvGraphicFramePr>
+      <p:sp>
+        <p:nvSpPr>
+          <p:cNvPr id="3" name="Content Placeholder 2"/>
+          <p:cNvSpPr>
+            <a:spLocks noGrp="1"/>
+          </p:cNvSpPr>
           <p:nvPr>
             <p:ph idx="1"/>
           </p:nvPr>
-        </p:nvGraphicFramePr>
-        <p:xfrm>
-          <a:off x="457200" y="1600200"/>
-          <a:ext cx="8229600" cy="2392680"/>
-        </p:xfrm>
-        <a:graphic>
-          <a:graphicData uri="http://schemas.openxmlformats.org/drawingml/2006/table">
-            <a:tbl>
-              <a:tblPr firstRow="1" bandRow="1">
-                <a:tableStyleId>{5C22544A-7EE6-4342-B048-85BDC9FD1C3A}</a:tableStyleId>
-              </a:tblPr>
-              <a:tblGrid>
-                <a:gridCol w="1378496"/>
-                <a:gridCol w="1512168"/>
-                <a:gridCol w="1656184"/>
-                <a:gridCol w="1728192"/>
-                <a:gridCol w="1954560"/>
-              </a:tblGrid>
-              <a:tr h="370840">
-                <a:tc>
-                  <a:txBody>
-                    <a:bodyPr/>
-                    <a:lstStyle/>
-                    <a:p>
-                      <a:r>
-                        <a:rPr lang="en-NZ" smtClean="0"/>
-                        <a:t>Varname</a:t>
-                      </a:r>
-                      <a:endParaRPr lang="en-NZ" dirty="0"/>
-                    </a:p>
-                  </a:txBody>
-                  <a:tcPr/>
-                </a:tc>
-                <a:tc>
-                  <a:txBody>
-                    <a:bodyPr/>
-                    <a:lstStyle/>
-                    <a:p>
-                      <a:r>
-                        <a:rPr lang="en-NZ" dirty="0" err="1" smtClean="0"/>
-                        <a:t>Previous_var</a:t>
-                      </a:r>
-                      <a:endParaRPr lang="en-NZ" dirty="0"/>
-                    </a:p>
-                  </a:txBody>
-                  <a:tcPr/>
-                </a:tc>
-                <a:tc>
-                  <a:txBody>
-                    <a:bodyPr/>
-                    <a:lstStyle/>
-                    <a:p>
-                      <a:r>
-                        <a:rPr lang="en-NZ" dirty="0" err="1" smtClean="0"/>
-                        <a:t>Initial_value</a:t>
-                      </a:r>
-                      <a:endParaRPr lang="en-NZ" dirty="0"/>
-                    </a:p>
-                  </a:txBody>
-                  <a:tcPr/>
-                </a:tc>
-                <a:tc>
-                  <a:txBody>
-                    <a:bodyPr/>
-                    <a:lstStyle/>
-                    <a:p>
-                      <a:r>
-                        <a:rPr lang="en-NZ" dirty="0" err="1" smtClean="0"/>
-                        <a:t>Outcome_type</a:t>
-                      </a:r>
-                      <a:endParaRPr lang="en-NZ" dirty="0"/>
-                    </a:p>
-                  </a:txBody>
-                  <a:tcPr/>
-                </a:tc>
-                <a:tc>
-                  <a:txBody>
-                    <a:bodyPr/>
-                    <a:lstStyle/>
-                    <a:p>
-                      <a:r>
-                        <a:rPr lang="en-NZ" dirty="0" err="1" smtClean="0"/>
-                        <a:t>Outcome_module</a:t>
-                      </a:r>
-                      <a:endParaRPr lang="en-NZ" dirty="0"/>
-                    </a:p>
-                  </a:txBody>
-                  <a:tcPr/>
-                </a:tc>
-              </a:tr>
-              <a:tr h="370840">
-                <a:tc>
-                  <a:txBody>
-                    <a:bodyPr/>
-                    <a:lstStyle/>
-                    <a:p>
-                      <a:r>
-                        <a:rPr lang="en-NZ" dirty="0" smtClean="0"/>
-                        <a:t>Age</a:t>
-                      </a:r>
-                      <a:endParaRPr lang="en-NZ" dirty="0"/>
-                    </a:p>
-                  </a:txBody>
-                  <a:tcPr/>
-                </a:tc>
-                <a:tc>
-                  <a:txBody>
-                    <a:bodyPr/>
-                    <a:lstStyle/>
-                    <a:p>
-                      <a:endParaRPr lang="en-NZ" dirty="0"/>
-                    </a:p>
-                  </a:txBody>
-                  <a:tcPr/>
-                </a:tc>
-                <a:tc>
-                  <a:txBody>
-                    <a:bodyPr/>
-                    <a:lstStyle/>
-                    <a:p>
-                      <a:r>
-                        <a:rPr lang="en-NZ" dirty="0" err="1" smtClean="0"/>
-                        <a:t>Basefile_age</a:t>
-                      </a:r>
-                      <a:endParaRPr lang="en-NZ" dirty="0"/>
-                    </a:p>
-                  </a:txBody>
-                  <a:tcPr/>
-                </a:tc>
-                <a:tc>
-                  <a:txBody>
-                    <a:bodyPr/>
-                    <a:lstStyle/>
-                    <a:p>
-                      <a:endParaRPr lang="en-NZ" dirty="0"/>
-                    </a:p>
-                  </a:txBody>
-                  <a:tcPr/>
-                </a:tc>
-                <a:tc>
-                  <a:txBody>
-                    <a:bodyPr/>
-                    <a:lstStyle/>
-                    <a:p>
-                      <a:endParaRPr lang="en-NZ" dirty="0"/>
-                    </a:p>
-                  </a:txBody>
-                  <a:tcPr/>
-                </a:tc>
-              </a:tr>
-              <a:tr h="370840">
-                <a:tc>
-                  <a:txBody>
-                    <a:bodyPr/>
-                    <a:lstStyle/>
-                    <a:p>
-                      <a:r>
-                        <a:rPr lang="en-NZ" dirty="0" smtClean="0"/>
-                        <a:t>Health</a:t>
-                      </a:r>
-                      <a:endParaRPr lang="en-NZ" dirty="0"/>
-                    </a:p>
-                  </a:txBody>
-                  <a:tcPr/>
-                </a:tc>
-                <a:tc>
-                  <a:txBody>
-                    <a:bodyPr/>
-                    <a:lstStyle/>
-                    <a:p>
-                      <a:r>
-                        <a:rPr lang="en-NZ" dirty="0" err="1" smtClean="0"/>
-                        <a:t>Health_previous</a:t>
-                      </a:r>
-                      <a:endParaRPr lang="en-NZ" dirty="0"/>
-                    </a:p>
-                  </a:txBody>
-                  <a:tcPr/>
-                </a:tc>
-                <a:tc>
-                  <a:txBody>
-                    <a:bodyPr/>
-                    <a:lstStyle/>
-                    <a:p>
-                      <a:r>
-                        <a:rPr lang="en-NZ" dirty="0" smtClean="0"/>
-                        <a:t>0</a:t>
-                      </a:r>
-                      <a:endParaRPr lang="en-NZ" dirty="0"/>
-                    </a:p>
-                  </a:txBody>
-                  <a:tcPr/>
-                </a:tc>
-                <a:tc>
-                  <a:txBody>
-                    <a:bodyPr/>
-                    <a:lstStyle/>
-                    <a:p>
-                      <a:r>
-                        <a:rPr lang="en-NZ" dirty="0" smtClean="0"/>
-                        <a:t>categorical</a:t>
-                      </a:r>
-                      <a:endParaRPr lang="en-NZ" dirty="0"/>
-                    </a:p>
-                  </a:txBody>
-                  <a:tcPr/>
-                </a:tc>
-                <a:tc>
-                  <a:txBody>
-                    <a:bodyPr/>
-                    <a:lstStyle/>
-                    <a:p>
-                      <a:r>
-                        <a:rPr lang="en-NZ" dirty="0" smtClean="0"/>
-                        <a:t>Main</a:t>
-                      </a:r>
-                      <a:endParaRPr lang="en-NZ" dirty="0"/>
-                    </a:p>
-                  </a:txBody>
-                  <a:tcPr/>
-                </a:tc>
-              </a:tr>
-              <a:tr h="370840">
-                <a:tc>
-                  <a:txBody>
-                    <a:bodyPr/>
-                    <a:lstStyle/>
-                    <a:p>
-                      <a:r>
-                        <a:rPr lang="en-NZ" dirty="0" err="1" smtClean="0"/>
-                        <a:t>Health_previous</a:t>
-                      </a:r>
-                      <a:endParaRPr lang="en-NZ" dirty="0"/>
-                    </a:p>
-                  </a:txBody>
-                  <a:tcPr/>
-                </a:tc>
-                <a:tc>
-                  <a:txBody>
-                    <a:bodyPr/>
-                    <a:lstStyle/>
-                    <a:p>
-                      <a:endParaRPr lang="en-NZ" dirty="0"/>
-                    </a:p>
-                  </a:txBody>
-                  <a:tcPr/>
-                </a:tc>
-                <a:tc>
-                  <a:txBody>
-                    <a:bodyPr/>
-                    <a:lstStyle/>
-                    <a:p>
-                      <a:r>
-                        <a:rPr lang="en-NZ" dirty="0" smtClean="0"/>
-                        <a:t>NA</a:t>
-                      </a:r>
-                      <a:endParaRPr lang="en-NZ" dirty="0"/>
-                    </a:p>
-                  </a:txBody>
-                  <a:tcPr/>
-                </a:tc>
-                <a:tc>
-                  <a:txBody>
-                    <a:bodyPr/>
-                    <a:lstStyle/>
-                    <a:p>
-                      <a:endParaRPr lang="en-NZ" dirty="0"/>
-                    </a:p>
-                  </a:txBody>
-                  <a:tcPr/>
-                </a:tc>
-                <a:tc>
-                  <a:txBody>
-                    <a:bodyPr/>
-                    <a:lstStyle/>
-                    <a:p>
-                      <a:endParaRPr lang="en-NZ" dirty="0"/>
-                    </a:p>
-                  </a:txBody>
-                  <a:tcPr/>
-                </a:tc>
-              </a:tr>
-              <a:tr h="370840">
-                <a:tc>
-                  <a:txBody>
-                    <a:bodyPr/>
-                    <a:lstStyle/>
-                    <a:p>
-                      <a:r>
-                        <a:rPr lang="en-NZ" dirty="0" smtClean="0"/>
-                        <a:t>Earnings</a:t>
-                      </a:r>
-                      <a:endParaRPr lang="en-NZ" dirty="0"/>
-                    </a:p>
-                  </a:txBody>
-                  <a:tcPr/>
-                </a:tc>
-                <a:tc>
-                  <a:txBody>
-                    <a:bodyPr/>
-                    <a:lstStyle/>
-                    <a:p>
-                      <a:endParaRPr lang="en-NZ" dirty="0"/>
-                    </a:p>
-                  </a:txBody>
-                  <a:tcPr/>
-                </a:tc>
-                <a:tc>
-                  <a:txBody>
-                    <a:bodyPr/>
-                    <a:lstStyle/>
-                    <a:p>
-                      <a:r>
-                        <a:rPr lang="en-NZ" dirty="0" smtClean="0"/>
-                        <a:t>0</a:t>
-                      </a:r>
-                      <a:endParaRPr lang="en-NZ" dirty="0"/>
-                    </a:p>
-                  </a:txBody>
-                  <a:tcPr/>
-                </a:tc>
-                <a:tc>
-                  <a:txBody>
-                    <a:bodyPr/>
-                    <a:lstStyle/>
-                    <a:p>
-                      <a:r>
-                        <a:rPr lang="en-NZ" dirty="0" smtClean="0"/>
-                        <a:t>continuous</a:t>
-                      </a:r>
-                      <a:endParaRPr lang="en-NZ" dirty="0"/>
-                    </a:p>
-                  </a:txBody>
-                  <a:tcPr/>
-                </a:tc>
-                <a:tc>
-                  <a:txBody>
-                    <a:bodyPr/>
-                    <a:lstStyle/>
-                    <a:p>
-                      <a:r>
-                        <a:rPr lang="en-NZ" dirty="0" smtClean="0"/>
-                        <a:t>Main</a:t>
-                      </a:r>
-                      <a:endParaRPr lang="en-NZ" dirty="0"/>
-                    </a:p>
-                  </a:txBody>
-                  <a:tcPr/>
-                </a:tc>
-              </a:tr>
-            </a:tbl>
-          </a:graphicData>
-        </a:graphic>
-      </p:graphicFrame>
+        </p:nvSpPr>
+        <p:spPr/>
+        <p:txBody>
+          <a:bodyPr>
+            <a:normAutofit fontScale="70000" lnSpcReduction="20000"/>
+          </a:bodyPr>
+          <a:lstStyle/>
+          <a:p>
+            <a:r>
+              <a:rPr lang="en-NZ" dirty="0" err="1" smtClean="0"/>
+              <a:t>Varname</a:t>
+            </a:r>
+            <a:r>
+              <a:rPr lang="en-NZ" dirty="0" smtClean="0"/>
+              <a:t>: </a:t>
+            </a:r>
+          </a:p>
+          <a:p>
+            <a:pPr lvl="1"/>
+            <a:r>
+              <a:rPr lang="en-NZ" dirty="0" smtClean="0"/>
+              <a:t>the name of a variable in the </a:t>
+            </a:r>
+            <a:r>
+              <a:rPr lang="en-NZ" dirty="0" err="1" smtClean="0"/>
+              <a:t>simframe</a:t>
+            </a:r>
+            <a:endParaRPr lang="en-NZ" dirty="0" smtClean="0"/>
+          </a:p>
+          <a:p>
+            <a:r>
+              <a:rPr lang="en-NZ" dirty="0" err="1" smtClean="0"/>
+              <a:t>Previous_var</a:t>
+            </a:r>
+            <a:endParaRPr lang="en-NZ" dirty="0" smtClean="0"/>
+          </a:p>
+          <a:p>
+            <a:pPr lvl="1"/>
+            <a:r>
+              <a:rPr lang="en-NZ" dirty="0" smtClean="0"/>
+              <a:t>the </a:t>
+            </a:r>
+            <a:r>
+              <a:rPr lang="en-NZ" dirty="0"/>
+              <a:t>name of a variable in which to store the current value in at the </a:t>
+            </a:r>
+            <a:r>
+              <a:rPr lang="en-NZ" dirty="0" smtClean="0"/>
+              <a:t>beginning of </a:t>
+            </a:r>
+            <a:r>
+              <a:rPr lang="en-NZ" dirty="0"/>
+              <a:t>each iteration (</a:t>
+            </a:r>
+            <a:r>
+              <a:rPr lang="en-NZ" dirty="0" err="1"/>
+              <a:t>i.e</a:t>
+            </a:r>
+            <a:r>
+              <a:rPr lang="en-NZ" dirty="0"/>
+              <a:t>: before it's transformed</a:t>
+            </a:r>
+            <a:r>
+              <a:rPr lang="en-NZ" dirty="0" smtClean="0"/>
+              <a:t>).</a:t>
+            </a:r>
+          </a:p>
+          <a:p>
+            <a:pPr lvl="1"/>
+            <a:r>
+              <a:rPr lang="en-NZ" dirty="0" smtClean="0"/>
+              <a:t>Optional </a:t>
+            </a:r>
+            <a:r>
+              <a:rPr lang="en-NZ" dirty="0"/>
+              <a:t>- for models that require previous state</a:t>
+            </a:r>
+            <a:r>
+              <a:rPr lang="en-NZ" dirty="0" smtClean="0"/>
+              <a:t>.</a:t>
+            </a:r>
+            <a:endParaRPr lang="en-NZ" dirty="0"/>
+          </a:p>
+          <a:p>
+            <a:r>
+              <a:rPr lang="en-NZ" dirty="0" err="1" smtClean="0"/>
+              <a:t>Initial_value</a:t>
+            </a:r>
+            <a:endParaRPr lang="en-NZ" dirty="0" smtClean="0"/>
+          </a:p>
+          <a:p>
+            <a:pPr lvl="1"/>
+            <a:r>
+              <a:rPr lang="en-NZ" dirty="0"/>
+              <a:t>an expression that generates the initial value of the variable</a:t>
+            </a:r>
+            <a:r>
+              <a:rPr lang="en-NZ" dirty="0" smtClean="0"/>
+              <a:t>. Typically this expression will reference values in a previously loaded </a:t>
+            </a:r>
+            <a:r>
+              <a:rPr lang="en-NZ" dirty="0" err="1" smtClean="0"/>
+              <a:t>basefile</a:t>
+            </a:r>
+            <a:r>
+              <a:rPr lang="en-NZ" dirty="0" smtClean="0"/>
+              <a:t>.</a:t>
+            </a:r>
+          </a:p>
+          <a:p>
+            <a:r>
+              <a:rPr lang="en-NZ" dirty="0" err="1" smtClean="0"/>
+              <a:t>Outcome_type</a:t>
+            </a:r>
+            <a:endParaRPr lang="en-NZ" dirty="0" smtClean="0"/>
+          </a:p>
+          <a:p>
+            <a:pPr lvl="1"/>
+            <a:r>
+              <a:rPr lang="en-NZ" dirty="0"/>
+              <a:t>i</a:t>
+            </a:r>
+            <a:r>
+              <a:rPr lang="en-NZ" dirty="0" smtClean="0"/>
+              <a:t>f specified, indicates this is an outcome variable and indicates its type which is one of “categorical” or “continuous”</a:t>
+            </a:r>
+          </a:p>
+          <a:p>
+            <a:r>
+              <a:rPr lang="en-NZ" dirty="0" err="1" smtClean="0"/>
+              <a:t>Outcome_module</a:t>
+            </a:r>
+            <a:endParaRPr lang="en-NZ" dirty="0" smtClean="0"/>
+          </a:p>
+          <a:p>
+            <a:pPr lvl="1"/>
+            <a:r>
+              <a:rPr lang="en-NZ" dirty="0"/>
+              <a:t>if specified, indicates the </a:t>
+            </a:r>
+            <a:r>
+              <a:rPr lang="en-NZ" dirty="0" err="1" smtClean="0"/>
+              <a:t>Simmodule</a:t>
+            </a:r>
+            <a:r>
+              <a:rPr lang="en-NZ" dirty="0" smtClean="0"/>
+              <a:t> </a:t>
+            </a:r>
+            <a:r>
+              <a:rPr lang="en-NZ" dirty="0"/>
+              <a:t>this outcome variable belongs to</a:t>
+            </a:r>
+            <a:endParaRPr lang="en-NZ" dirty="0" smtClean="0"/>
+          </a:p>
+          <a:p>
+            <a:pPr lvl="1"/>
+            <a:endParaRPr lang="en-NZ" dirty="0" smtClean="0"/>
+          </a:p>
+        </p:txBody>
+      </p:sp>
     </p:spTree>
   </p:cSld>
   <p:clrMapOvr>
@@ -11679,65 +11875,380 @@
           <a:lstStyle/>
           <a:p>
             <a:r>
+              <a:rPr lang="en-NZ" dirty="0" err="1" smtClean="0"/>
+              <a:t>Simframe</a:t>
+            </a:r>
+            <a:r>
               <a:rPr lang="en-NZ" dirty="0" smtClean="0"/>
-              <a:t>One </a:t>
-            </a:r>
-            <a:r>
-              <a:rPr lang="en-NZ" dirty="0" err="1" smtClean="0"/>
-              <a:t>simframe</a:t>
-            </a:r>
-            <a:r>
-              <a:rPr lang="en-NZ" dirty="0" smtClean="0"/>
-              <a:t> per environment</a:t>
+              <a:t> definition file</a:t>
             </a:r>
             <a:endParaRPr lang="en-NZ" dirty="0"/>
           </a:p>
         </p:txBody>
       </p:sp>
-      <p:sp>
-        <p:nvSpPr>
-          <p:cNvPr id="3" name="Content Placeholder 2"/>
-          <p:cNvSpPr>
-            <a:spLocks noGrp="1"/>
-          </p:cNvSpPr>
+      <p:graphicFrame>
+        <p:nvGraphicFramePr>
+          <p:cNvPr id="4" name="Content Placeholder 3"/>
+          <p:cNvGraphicFramePr>
+            <a:graphicFrameLocks noGrp="1"/>
+          </p:cNvGraphicFramePr>
           <p:nvPr>
             <p:ph idx="1"/>
           </p:nvPr>
-        </p:nvSpPr>
-        <p:spPr/>
-        <p:txBody>
-          <a:bodyPr/>
-          <a:lstStyle/>
-          <a:p>
-            <a:r>
-              <a:rPr lang="en-NZ" dirty="0" smtClean="0"/>
-              <a:t>When a simulation environment is created, it takes a copy of the master </a:t>
-            </a:r>
-            <a:r>
-              <a:rPr lang="en-NZ" dirty="0" err="1" smtClean="0"/>
-              <a:t>simframe</a:t>
-            </a:r>
-            <a:endParaRPr lang="en-NZ" dirty="0" smtClean="0"/>
-          </a:p>
-          <a:p>
-            <a:r>
-              <a:rPr lang="en-NZ" dirty="0" smtClean="0"/>
-              <a:t>Before simulating, a environment’s </a:t>
-            </a:r>
-            <a:r>
-              <a:rPr lang="en-NZ" dirty="0" err="1" smtClean="0"/>
-              <a:t>simframe</a:t>
-            </a:r>
-            <a:r>
-              <a:rPr lang="en-NZ" dirty="0" smtClean="0"/>
-              <a:t> may be modified to test a particular scenario</a:t>
-            </a:r>
-          </a:p>
-          <a:p>
-            <a:endParaRPr lang="en-NZ" dirty="0"/>
-          </a:p>
-        </p:txBody>
-      </p:sp>
+        </p:nvGraphicFramePr>
+        <p:xfrm>
+          <a:off x="457200" y="1600200"/>
+          <a:ext cx="8229600" cy="2392680"/>
+        </p:xfrm>
+        <a:graphic>
+          <a:graphicData uri="http://schemas.openxmlformats.org/drawingml/2006/table">
+            <a:tbl>
+              <a:tblPr firstRow="1" bandRow="1">
+                <a:tableStyleId>{5C22544A-7EE6-4342-B048-85BDC9FD1C3A}</a:tableStyleId>
+              </a:tblPr>
+              <a:tblGrid>
+                <a:gridCol w="1378496"/>
+                <a:gridCol w="1512168"/>
+                <a:gridCol w="1656184"/>
+                <a:gridCol w="1728192"/>
+                <a:gridCol w="1954560"/>
+              </a:tblGrid>
+              <a:tr h="370840">
+                <a:tc>
+                  <a:txBody>
+                    <a:bodyPr/>
+                    <a:lstStyle/>
+                    <a:p>
+                      <a:r>
+                        <a:rPr lang="en-NZ" smtClean="0"/>
+                        <a:t>Varname</a:t>
+                      </a:r>
+                      <a:endParaRPr lang="en-NZ" dirty="0"/>
+                    </a:p>
+                  </a:txBody>
+                  <a:tcPr/>
+                </a:tc>
+                <a:tc>
+                  <a:txBody>
+                    <a:bodyPr/>
+                    <a:lstStyle/>
+                    <a:p>
+                      <a:r>
+                        <a:rPr lang="en-NZ" dirty="0" err="1" smtClean="0"/>
+                        <a:t>Previous_var</a:t>
+                      </a:r>
+                      <a:endParaRPr lang="en-NZ" dirty="0"/>
+                    </a:p>
+                  </a:txBody>
+                  <a:tcPr/>
+                </a:tc>
+                <a:tc>
+                  <a:txBody>
+                    <a:bodyPr/>
+                    <a:lstStyle/>
+                    <a:p>
+                      <a:r>
+                        <a:rPr lang="en-NZ" dirty="0" err="1" smtClean="0"/>
+                        <a:t>Initial_value</a:t>
+                      </a:r>
+                      <a:endParaRPr lang="en-NZ" dirty="0"/>
+                    </a:p>
+                  </a:txBody>
+                  <a:tcPr/>
+                </a:tc>
+                <a:tc>
+                  <a:txBody>
+                    <a:bodyPr/>
+                    <a:lstStyle/>
+                    <a:p>
+                      <a:r>
+                        <a:rPr lang="en-NZ" dirty="0" err="1" smtClean="0"/>
+                        <a:t>Outcome_type</a:t>
+                      </a:r>
+                      <a:endParaRPr lang="en-NZ" dirty="0"/>
+                    </a:p>
+                  </a:txBody>
+                  <a:tcPr/>
+                </a:tc>
+                <a:tc>
+                  <a:txBody>
+                    <a:bodyPr/>
+                    <a:lstStyle/>
+                    <a:p>
+                      <a:r>
+                        <a:rPr lang="en-NZ" dirty="0" err="1" smtClean="0"/>
+                        <a:t>Outcome_module</a:t>
+                      </a:r>
+                      <a:endParaRPr lang="en-NZ" dirty="0"/>
+                    </a:p>
+                  </a:txBody>
+                  <a:tcPr/>
+                </a:tc>
+              </a:tr>
+              <a:tr h="370840">
+                <a:tc>
+                  <a:txBody>
+                    <a:bodyPr/>
+                    <a:lstStyle/>
+                    <a:p>
+                      <a:r>
+                        <a:rPr lang="en-NZ" dirty="0" smtClean="0"/>
+                        <a:t>Age</a:t>
+                      </a:r>
+                      <a:endParaRPr lang="en-NZ" dirty="0"/>
+                    </a:p>
+                  </a:txBody>
+                  <a:tcPr/>
+                </a:tc>
+                <a:tc>
+                  <a:txBody>
+                    <a:bodyPr/>
+                    <a:lstStyle/>
+                    <a:p>
+                      <a:endParaRPr lang="en-NZ" dirty="0"/>
+                    </a:p>
+                  </a:txBody>
+                  <a:tcPr/>
+                </a:tc>
+                <a:tc>
+                  <a:txBody>
+                    <a:bodyPr/>
+                    <a:lstStyle/>
+                    <a:p>
+                      <a:r>
+                        <a:rPr lang="en-NZ" dirty="0" err="1" smtClean="0"/>
+                        <a:t>Basefile_age</a:t>
+                      </a:r>
+                      <a:endParaRPr lang="en-NZ" dirty="0"/>
+                    </a:p>
+                  </a:txBody>
+                  <a:tcPr/>
+                </a:tc>
+                <a:tc>
+                  <a:txBody>
+                    <a:bodyPr/>
+                    <a:lstStyle/>
+                    <a:p>
+                      <a:endParaRPr lang="en-NZ" dirty="0"/>
+                    </a:p>
+                  </a:txBody>
+                  <a:tcPr/>
+                </a:tc>
+                <a:tc>
+                  <a:txBody>
+                    <a:bodyPr/>
+                    <a:lstStyle/>
+                    <a:p>
+                      <a:endParaRPr lang="en-NZ" dirty="0"/>
+                    </a:p>
+                  </a:txBody>
+                  <a:tcPr/>
+                </a:tc>
+              </a:tr>
+              <a:tr h="370840">
+                <a:tc>
+                  <a:txBody>
+                    <a:bodyPr/>
+                    <a:lstStyle/>
+                    <a:p>
+                      <a:r>
+                        <a:rPr lang="en-NZ" dirty="0" smtClean="0"/>
+                        <a:t>Health</a:t>
+                      </a:r>
+                      <a:endParaRPr lang="en-NZ" dirty="0"/>
+                    </a:p>
+                  </a:txBody>
+                  <a:tcPr/>
+                </a:tc>
+                <a:tc>
+                  <a:txBody>
+                    <a:bodyPr/>
+                    <a:lstStyle/>
+                    <a:p>
+                      <a:r>
+                        <a:rPr lang="en-NZ" dirty="0" err="1" smtClean="0"/>
+                        <a:t>Health_previous</a:t>
+                      </a:r>
+                      <a:endParaRPr lang="en-NZ" dirty="0"/>
+                    </a:p>
+                  </a:txBody>
+                  <a:tcPr/>
+                </a:tc>
+                <a:tc>
+                  <a:txBody>
+                    <a:bodyPr/>
+                    <a:lstStyle/>
+                    <a:p>
+                      <a:r>
+                        <a:rPr lang="en-NZ" dirty="0" smtClean="0"/>
+                        <a:t>0</a:t>
+                      </a:r>
+                      <a:endParaRPr lang="en-NZ" dirty="0"/>
+                    </a:p>
+                  </a:txBody>
+                  <a:tcPr/>
+                </a:tc>
+                <a:tc>
+                  <a:txBody>
+                    <a:bodyPr/>
+                    <a:lstStyle/>
+                    <a:p>
+                      <a:r>
+                        <a:rPr lang="en-NZ" dirty="0" smtClean="0"/>
+                        <a:t>categorical</a:t>
+                      </a:r>
+                      <a:endParaRPr lang="en-NZ" dirty="0"/>
+                    </a:p>
+                  </a:txBody>
+                  <a:tcPr/>
+                </a:tc>
+                <a:tc>
+                  <a:txBody>
+                    <a:bodyPr/>
+                    <a:lstStyle/>
+                    <a:p>
+                      <a:r>
+                        <a:rPr lang="en-NZ" dirty="0" smtClean="0"/>
+                        <a:t>Main</a:t>
+                      </a:r>
+                      <a:endParaRPr lang="en-NZ" dirty="0"/>
+                    </a:p>
+                  </a:txBody>
+                  <a:tcPr/>
+                </a:tc>
+              </a:tr>
+              <a:tr h="370840">
+                <a:tc>
+                  <a:txBody>
+                    <a:bodyPr/>
+                    <a:lstStyle/>
+                    <a:p>
+                      <a:r>
+                        <a:rPr lang="en-NZ" dirty="0" err="1" smtClean="0"/>
+                        <a:t>Health_previous</a:t>
+                      </a:r>
+                      <a:endParaRPr lang="en-NZ" dirty="0"/>
+                    </a:p>
+                  </a:txBody>
+                  <a:tcPr/>
+                </a:tc>
+                <a:tc>
+                  <a:txBody>
+                    <a:bodyPr/>
+                    <a:lstStyle/>
+                    <a:p>
+                      <a:endParaRPr lang="en-NZ" dirty="0"/>
+                    </a:p>
+                  </a:txBody>
+                  <a:tcPr/>
+                </a:tc>
+                <a:tc>
+                  <a:txBody>
+                    <a:bodyPr/>
+                    <a:lstStyle/>
+                    <a:p>
+                      <a:r>
+                        <a:rPr lang="en-NZ" dirty="0" smtClean="0"/>
+                        <a:t>NA</a:t>
+                      </a:r>
+                      <a:endParaRPr lang="en-NZ" dirty="0"/>
+                    </a:p>
+                  </a:txBody>
+                  <a:tcPr/>
+                </a:tc>
+                <a:tc>
+                  <a:txBody>
+                    <a:bodyPr/>
+                    <a:lstStyle/>
+                    <a:p>
+                      <a:endParaRPr lang="en-NZ" dirty="0"/>
+                    </a:p>
+                  </a:txBody>
+                  <a:tcPr/>
+                </a:tc>
+                <a:tc>
+                  <a:txBody>
+                    <a:bodyPr/>
+                    <a:lstStyle/>
+                    <a:p>
+                      <a:endParaRPr lang="en-NZ" dirty="0"/>
+                    </a:p>
+                  </a:txBody>
+                  <a:tcPr/>
+                </a:tc>
+              </a:tr>
+              <a:tr h="370840">
+                <a:tc>
+                  <a:txBody>
+                    <a:bodyPr/>
+                    <a:lstStyle/>
+                    <a:p>
+                      <a:r>
+                        <a:rPr lang="en-NZ" dirty="0" smtClean="0"/>
+                        <a:t>Earnings</a:t>
+                      </a:r>
+                      <a:endParaRPr lang="en-NZ" dirty="0"/>
+                    </a:p>
+                  </a:txBody>
+                  <a:tcPr/>
+                </a:tc>
+                <a:tc>
+                  <a:txBody>
+                    <a:bodyPr/>
+                    <a:lstStyle/>
+                    <a:p>
+                      <a:endParaRPr lang="en-NZ" dirty="0"/>
+                    </a:p>
+                  </a:txBody>
+                  <a:tcPr/>
+                </a:tc>
+                <a:tc>
+                  <a:txBody>
+                    <a:bodyPr/>
+                    <a:lstStyle/>
+                    <a:p>
+                      <a:r>
+                        <a:rPr lang="en-NZ" dirty="0" smtClean="0"/>
+                        <a:t>0</a:t>
+                      </a:r>
+                      <a:endParaRPr lang="en-NZ" dirty="0"/>
+                    </a:p>
+                  </a:txBody>
+                  <a:tcPr/>
+                </a:tc>
+                <a:tc>
+                  <a:txBody>
+                    <a:bodyPr/>
+                    <a:lstStyle/>
+                    <a:p>
+                      <a:r>
+                        <a:rPr lang="en-NZ" dirty="0" smtClean="0"/>
+                        <a:t>continuous</a:t>
+                      </a:r>
+                      <a:endParaRPr lang="en-NZ" dirty="0"/>
+                    </a:p>
+                  </a:txBody>
+                  <a:tcPr/>
+                </a:tc>
+                <a:tc>
+                  <a:txBody>
+                    <a:bodyPr/>
+                    <a:lstStyle/>
+                    <a:p>
+                      <a:r>
+                        <a:rPr lang="en-NZ" dirty="0" smtClean="0"/>
+                        <a:t>Main</a:t>
+                      </a:r>
+                      <a:endParaRPr lang="en-NZ" dirty="0"/>
+                    </a:p>
+                  </a:txBody>
+                  <a:tcPr/>
+                </a:tc>
+              </a:tr>
+            </a:tbl>
+          </a:graphicData>
+        </a:graphic>
+      </p:graphicFrame>
     </p:spTree>
   </p:cSld>
   <p:clrMapOvr>
@@ -11780,7 +12291,15 @@
           <a:p>
             <a:r>
               <a:rPr lang="en-NZ" dirty="0" smtClean="0"/>
-              <a:t>The simulation process</a:t>
+              <a:t>One </a:t>
+            </a:r>
+            <a:r>
+              <a:rPr lang="en-NZ" dirty="0" err="1" smtClean="0"/>
+              <a:t>simframe</a:t>
+            </a:r>
+            <a:r>
+              <a:rPr lang="en-NZ" dirty="0" smtClean="0"/>
+              <a:t> per environment</a:t>
             </a:r>
             <a:endParaRPr lang="en-NZ" dirty="0"/>
           </a:p>
@@ -11796,116 +12315,41 @@
             <p:ph idx="1"/>
           </p:nvPr>
         </p:nvSpPr>
-        <p:spPr>
-          <a:xfrm>
-            <a:off x="467544" y="1628800"/>
-            <a:ext cx="8229600" cy="4525963"/>
-          </a:xfrm>
-        </p:spPr>
+        <p:spPr/>
         <p:txBody>
-          <a:bodyPr>
-            <a:normAutofit fontScale="77500" lnSpcReduction="20000"/>
-          </a:bodyPr>
+          <a:bodyPr/>
           <a:lstStyle/>
           <a:p>
             <a:r>
               <a:rPr lang="en-NZ" dirty="0" smtClean="0"/>
-              <a:t>Categorical adjustments for iteration 1 are applied to the </a:t>
+              <a:t>When a simulation environment is created, it takes a copy of the master </a:t>
             </a:r>
             <a:r>
               <a:rPr lang="en-NZ" dirty="0" err="1" smtClean="0"/>
               <a:t>simframe</a:t>
             </a:r>
+            <a:endParaRPr lang="en-NZ" dirty="0" smtClean="0"/>
+          </a:p>
+          <a:p>
             <a:r>
               <a:rPr lang="en-NZ" dirty="0" smtClean="0"/>
-              <a:t>. The adjustments applied are specified in the </a:t>
+              <a:t>Before simulating, a environment’s </a:t>
             </a:r>
             <a:r>
               <a:rPr lang="en-NZ" dirty="0" err="1" smtClean="0"/>
-              <a:t>cat.adjustments</a:t>
+              <a:t>simframe</a:t>
             </a:r>
             <a:r>
               <a:rPr lang="en-NZ" dirty="0" smtClean="0"/>
-              <a:t> variable. </a:t>
-            </a:r>
-          </a:p>
-          <a:p>
-            <a:pPr lvl="1"/>
-            <a:r>
-              <a:rPr lang="en-NZ" dirty="0" smtClean="0"/>
-              <a:t>Other adjustments that might need to be performed, such as adjustments to continuous variables, can be done outside </a:t>
-            </a:r>
-            <a:r>
-              <a:rPr lang="en-NZ" dirty="0" err="1" smtClean="0"/>
-              <a:t>simario</a:t>
-            </a:r>
-            <a:r>
-              <a:rPr lang="en-NZ" dirty="0" smtClean="0"/>
-              <a:t> </a:t>
-            </a:r>
-            <a:r>
-              <a:rPr lang="en-NZ" dirty="0" smtClean="0"/>
-              <a:t>by the user before simulation.</a:t>
-            </a:r>
-          </a:p>
-          <a:p>
-            <a:r>
-              <a:rPr lang="en-NZ" dirty="0" smtClean="0"/>
-              <a:t>Pre simulation stats are generated</a:t>
-            </a:r>
-          </a:p>
-          <a:p>
-            <a:r>
-              <a:rPr lang="en-NZ" dirty="0" smtClean="0"/>
-              <a:t>Run loop</a:t>
-            </a:r>
-          </a:p>
-          <a:p>
-            <a:pPr lvl="1"/>
-            <a:r>
-              <a:rPr lang="en-NZ" dirty="0" smtClean="0"/>
-              <a:t>During each run, the following functions are called on each module</a:t>
-            </a:r>
-          </a:p>
-          <a:p>
-            <a:pPr lvl="2"/>
-            <a:r>
-              <a:rPr lang="en-NZ" dirty="0" err="1" smtClean="0"/>
-              <a:t>simulateRun</a:t>
-            </a:r>
-            <a:endParaRPr lang="en-NZ" dirty="0" smtClean="0"/>
-          </a:p>
-          <a:p>
-            <a:pPr lvl="2"/>
-            <a:r>
-              <a:rPr lang="en-NZ" dirty="0" err="1" smtClean="0"/>
-              <a:t>appendRunStats</a:t>
-            </a:r>
-            <a:endParaRPr lang="en-NZ" dirty="0" smtClean="0"/>
-          </a:p>
-          <a:p>
-            <a:r>
-              <a:rPr lang="en-NZ" dirty="0" smtClean="0"/>
-              <a:t>Final results are calculated by each module across all runs (using the </a:t>
-            </a:r>
-            <a:r>
-              <a:rPr lang="en-NZ" dirty="0" err="1" smtClean="0"/>
-              <a:t>calcFinalResults</a:t>
-            </a:r>
-            <a:r>
-              <a:rPr lang="en-NZ" dirty="0" smtClean="0"/>
-              <a:t> function)</a:t>
-            </a:r>
+              <a:t> may be modified to test a particular scenario</a:t>
+            </a:r>
+          </a:p>
+          <a:p>
             <a:endParaRPr lang="en-NZ" dirty="0"/>
           </a:p>
         </p:txBody>
       </p:sp>
     </p:spTree>
-    <p:extLst>
-      <p:ext uri="{BB962C8B-B14F-4D97-AF65-F5344CB8AC3E}">
-        <p14:creationId xmlns:p14="http://schemas.microsoft.com/office/powerpoint/2010/main" val="3435886797"/>
-      </p:ext>
-    </p:extLst>
   </p:cSld>
   <p:clrMapOvr>
     <a:masterClrMapping/>
@@ -11942,6 +12386,169 @@
         </p:nvSpPr>
         <p:spPr/>
         <p:txBody>
+          <a:bodyPr/>
+          <a:lstStyle/>
+          <a:p>
+            <a:r>
+              <a:rPr lang="en-NZ" dirty="0" smtClean="0"/>
+              <a:t>The simulation process</a:t>
+            </a:r>
+            <a:endParaRPr lang="en-NZ" dirty="0"/>
+          </a:p>
+        </p:txBody>
+      </p:sp>
+      <p:sp>
+        <p:nvSpPr>
+          <p:cNvPr id="3" name="Content Placeholder 2"/>
+          <p:cNvSpPr>
+            <a:spLocks noGrp="1"/>
+          </p:cNvSpPr>
+          <p:nvPr>
+            <p:ph idx="1"/>
+          </p:nvPr>
+        </p:nvSpPr>
+        <p:spPr>
+          <a:xfrm>
+            <a:off x="467544" y="1628800"/>
+            <a:ext cx="8229600" cy="4525963"/>
+          </a:xfrm>
+        </p:spPr>
+        <p:txBody>
+          <a:bodyPr>
+            <a:normAutofit fontScale="77500" lnSpcReduction="20000"/>
+          </a:bodyPr>
+          <a:lstStyle/>
+          <a:p>
+            <a:r>
+              <a:rPr lang="en-NZ" dirty="0" smtClean="0"/>
+              <a:t>Categorical adjustments for iteration 1 are applied to the </a:t>
+            </a:r>
+            <a:r>
+              <a:rPr lang="en-NZ" dirty="0" err="1" smtClean="0"/>
+              <a:t>simframe</a:t>
+            </a:r>
+            <a:r>
+              <a:rPr lang="en-NZ" dirty="0" smtClean="0"/>
+              <a:t>. The adjustments applied are specified in the </a:t>
+            </a:r>
+            <a:r>
+              <a:rPr lang="en-NZ" dirty="0" err="1" smtClean="0"/>
+              <a:t>cat.adjustments</a:t>
+            </a:r>
+            <a:r>
+              <a:rPr lang="en-NZ" dirty="0" smtClean="0"/>
+              <a:t> variable. </a:t>
+            </a:r>
+          </a:p>
+          <a:p>
+            <a:pPr lvl="1"/>
+            <a:r>
+              <a:rPr lang="en-NZ" dirty="0" smtClean="0"/>
+              <a:t>Other adjustments that might need to be performed, such as adjustments to continuous variables, can be done outside </a:t>
+            </a:r>
+            <a:r>
+              <a:rPr lang="en-NZ" dirty="0" err="1" smtClean="0"/>
+              <a:t>simario</a:t>
+            </a:r>
+            <a:r>
+              <a:rPr lang="en-NZ" dirty="0" smtClean="0"/>
+              <a:t> by the user before simulation.</a:t>
+            </a:r>
+          </a:p>
+          <a:p>
+            <a:r>
+              <a:rPr lang="en-NZ" dirty="0" smtClean="0"/>
+              <a:t>Pre simulation stats are generated</a:t>
+            </a:r>
+          </a:p>
+          <a:p>
+            <a:r>
+              <a:rPr lang="en-NZ" dirty="0" smtClean="0"/>
+              <a:t>Run loop</a:t>
+            </a:r>
+          </a:p>
+          <a:p>
+            <a:pPr lvl="1"/>
+            <a:r>
+              <a:rPr lang="en-NZ" dirty="0" smtClean="0"/>
+              <a:t>During each run, the following functions are called on each module</a:t>
+            </a:r>
+          </a:p>
+          <a:p>
+            <a:pPr lvl="2"/>
+            <a:r>
+              <a:rPr lang="en-NZ" dirty="0" err="1" smtClean="0"/>
+              <a:t>simulateRun</a:t>
+            </a:r>
+            <a:endParaRPr lang="en-NZ" dirty="0" smtClean="0"/>
+          </a:p>
+          <a:p>
+            <a:pPr lvl="2"/>
+            <a:r>
+              <a:rPr lang="en-NZ" dirty="0" err="1" smtClean="0"/>
+              <a:t>appendRunStats</a:t>
+            </a:r>
+            <a:endParaRPr lang="en-NZ" dirty="0" smtClean="0"/>
+          </a:p>
+          <a:p>
+            <a:r>
+              <a:rPr lang="en-NZ" dirty="0" smtClean="0"/>
+              <a:t>Final results are calculated by each module across all runs (using the </a:t>
+            </a:r>
+            <a:r>
+              <a:rPr lang="en-NZ" dirty="0" err="1" smtClean="0"/>
+              <a:t>calcFinalResults</a:t>
+            </a:r>
+            <a:r>
+              <a:rPr lang="en-NZ" dirty="0" smtClean="0"/>
+              <a:t> function)</a:t>
+            </a:r>
+            <a:endParaRPr lang="en-NZ" dirty="0"/>
+          </a:p>
+        </p:txBody>
+      </p:sp>
+    </p:spTree>
+    <p:extLst>
+      <p:ext uri="{BB962C8B-B14F-4D97-AF65-F5344CB8AC3E}">
+        <p14:creationId xmlns:p14="http://schemas.microsoft.com/office/powerpoint/2010/main" val="3435886797"/>
+      </p:ext>
+    </p:extLst>
+  </p:cSld>
+  <p:clrMapOvr>
+    <a:masterClrMapping/>
+  </p:clrMapOvr>
+</p:sld>
+</file>
+
+<file path=ppt/slides/slide23.xml><?xml version="1.0" encoding="utf-8"?>
+<p:sld xmlns:a="http://schemas.openxmlformats.org/drawingml/2006/main" xmlns:r="http://schemas.openxmlformats.org/officeDocument/2006/relationships" xmlns:p="http://schemas.openxmlformats.org/presentationml/2006/main">
+  <p:cSld>
+    <p:spTree>
+      <p:nvGrpSpPr>
+        <p:cNvPr id="1" name=""/>
+        <p:cNvGrpSpPr/>
+        <p:nvPr/>
+      </p:nvGrpSpPr>
+      <p:grpSpPr>
+        <a:xfrm>
+          <a:off x="0" y="0"/>
+          <a:ext cx="0" cy="0"/>
+          <a:chOff x="0" y="0"/>
+          <a:chExt cx="0" cy="0"/>
+        </a:xfrm>
+      </p:grpSpPr>
+      <p:sp>
+        <p:nvSpPr>
+          <p:cNvPr id="2" name="Title 1"/>
+          <p:cNvSpPr>
+            <a:spLocks noGrp="1"/>
+          </p:cNvSpPr>
+          <p:nvPr>
+            <p:ph type="title"/>
+          </p:nvPr>
+        </p:nvSpPr>
+        <p:spPr/>
+        <p:txBody>
           <a:bodyPr>
             <a:normAutofit/>
           </a:bodyPr>
@@ -12113,7 +12720,7 @@
 </p:sld>
 </file>
 
-<file path=ppt/slides/slide23.xml><?xml version="1.0" encoding="utf-8"?>
+<file path=ppt/slides/slide24.xml><?xml version="1.0" encoding="utf-8"?>
 <p:sld xmlns:a="http://schemas.openxmlformats.org/drawingml/2006/main" xmlns:r="http://schemas.openxmlformats.org/officeDocument/2006/relationships" xmlns:p="http://schemas.openxmlformats.org/presentationml/2006/main">
   <p:cSld>
     <p:spTree>
@@ -15536,207 +16143,6 @@
 </p:sld>
 </file>
 
-<file path=ppt/slides/slide24.xml><?xml version="1.0" encoding="utf-8"?>
-<p:sld xmlns:a="http://schemas.openxmlformats.org/drawingml/2006/main" xmlns:r="http://schemas.openxmlformats.org/officeDocument/2006/relationships" xmlns:p="http://schemas.openxmlformats.org/presentationml/2006/main">
-  <p:cSld>
-    <p:spTree>
-      <p:nvGrpSpPr>
-        <p:cNvPr id="1" name=""/>
-        <p:cNvGrpSpPr/>
-        <p:nvPr/>
-      </p:nvGrpSpPr>
-      <p:grpSpPr>
-        <a:xfrm>
-          <a:off x="0" y="0"/>
-          <a:ext cx="0" cy="0"/>
-          <a:chOff x="0" y="0"/>
-          <a:chExt cx="0" cy="0"/>
-        </a:xfrm>
-      </p:grpSpPr>
-      <p:sp>
-        <p:nvSpPr>
-          <p:cNvPr id="2" name="Title 1"/>
-          <p:cNvSpPr>
-            <a:spLocks noGrp="1"/>
-          </p:cNvSpPr>
-          <p:nvPr>
-            <p:ph type="title"/>
-          </p:nvPr>
-        </p:nvSpPr>
-        <p:spPr/>
-        <p:txBody>
-          <a:bodyPr/>
-          <a:lstStyle/>
-          <a:p>
-            <a:r>
-              <a:rPr lang="en-NZ" dirty="0" err="1" smtClean="0"/>
-              <a:t>appendRunStats</a:t>
-            </a:r>
-            <a:endParaRPr lang="en-NZ" dirty="0"/>
-          </a:p>
-        </p:txBody>
-      </p:sp>
-      <p:sp>
-        <p:nvSpPr>
-          <p:cNvPr id="3" name="Content Placeholder 2"/>
-          <p:cNvSpPr>
-            <a:spLocks noGrp="1"/>
-          </p:cNvSpPr>
-          <p:nvPr>
-            <p:ph idx="1"/>
-          </p:nvPr>
-        </p:nvSpPr>
-        <p:spPr/>
-        <p:txBody>
-          <a:bodyPr>
-            <a:normAutofit fontScale="70000" lnSpcReduction="20000"/>
-          </a:bodyPr>
-          <a:lstStyle/>
-          <a:p>
-            <a:r>
-              <a:rPr lang="en-NZ" dirty="0"/>
-              <a:t>At the end of each run a set of run stats is calculated for </a:t>
-            </a:r>
-            <a:r>
-              <a:rPr lang="en-NZ" dirty="0" smtClean="0"/>
-              <a:t>outcomes</a:t>
-            </a:r>
-          </a:p>
-          <a:p>
-            <a:r>
-              <a:rPr lang="en-NZ" dirty="0" smtClean="0"/>
-              <a:t>A run stat is any value from any outcome that you wish record and track across multiple runs</a:t>
-            </a:r>
-          </a:p>
-          <a:p>
-            <a:r>
-              <a:rPr lang="en-NZ" dirty="0" smtClean="0"/>
-              <a:t>Typically a run stat is an aggregate value calculated across each iteration (</a:t>
-            </a:r>
-            <a:r>
-              <a:rPr lang="en-NZ" dirty="0" err="1" smtClean="0"/>
-              <a:t>eg</a:t>
-            </a:r>
-            <a:r>
-              <a:rPr lang="en-NZ" dirty="0" smtClean="0"/>
-              <a:t>: a mean for </a:t>
-            </a:r>
-            <a:r>
-              <a:rPr lang="en-NZ" smtClean="0"/>
-              <a:t>each iteration) </a:t>
-            </a:r>
-            <a:r>
-              <a:rPr lang="en-NZ" dirty="0" smtClean="0"/>
-              <a:t>although it could be a result from a specific iteration</a:t>
-            </a:r>
-          </a:p>
-          <a:p>
-            <a:r>
-              <a:rPr lang="en-NZ" dirty="0" smtClean="0"/>
-              <a:t>Example of run stats include:</a:t>
-            </a:r>
-          </a:p>
-          <a:p>
-            <a:pPr lvl="1"/>
-            <a:r>
-              <a:rPr lang="en-NZ" dirty="0" smtClean="0"/>
-              <a:t>a </a:t>
-            </a:r>
-            <a:r>
-              <a:rPr lang="en-NZ" dirty="0"/>
-              <a:t>single </a:t>
-            </a:r>
-            <a:r>
-              <a:rPr lang="en-NZ" dirty="0" smtClean="0"/>
-              <a:t>value, e.g. mean</a:t>
-            </a:r>
-          </a:p>
-          <a:p>
-            <a:pPr lvl="1"/>
-            <a:r>
-              <a:rPr lang="en-NZ" dirty="0" smtClean="0"/>
-              <a:t>a vector, e.g. </a:t>
-            </a:r>
-            <a:r>
-              <a:rPr lang="en-NZ" dirty="0"/>
-              <a:t>frequencies, </a:t>
-            </a:r>
-            <a:r>
-              <a:rPr lang="en-NZ" dirty="0" err="1"/>
-              <a:t>quantiles</a:t>
-            </a:r>
-            <a:r>
-              <a:rPr lang="en-NZ" dirty="0"/>
-              <a:t>, </a:t>
-            </a:r>
-            <a:r>
-              <a:rPr lang="en-NZ" dirty="0" smtClean="0"/>
-              <a:t>summary</a:t>
-            </a:r>
-          </a:p>
-          <a:p>
-            <a:pPr lvl="1"/>
-            <a:r>
-              <a:rPr lang="en-NZ" dirty="0" smtClean="0"/>
-              <a:t>a matrix, e.g. </a:t>
-            </a:r>
-            <a:r>
-              <a:rPr lang="en-NZ" dirty="0"/>
-              <a:t>2 way </a:t>
-            </a:r>
-            <a:r>
-              <a:rPr lang="en-NZ" dirty="0" smtClean="0"/>
-              <a:t>table</a:t>
-            </a:r>
-          </a:p>
-          <a:p>
-            <a:r>
-              <a:rPr lang="en-NZ" dirty="0" smtClean="0"/>
-              <a:t>Run stat functions are available to produce</a:t>
-            </a:r>
-          </a:p>
-          <a:p>
-            <a:pPr lvl="1"/>
-            <a:r>
-              <a:rPr lang="en-NZ" dirty="0" smtClean="0"/>
-              <a:t>frequency tables (for both categorical and continuous variables)</a:t>
-            </a:r>
-          </a:p>
-          <a:p>
-            <a:pPr lvl="1"/>
-            <a:r>
-              <a:rPr lang="en-NZ" dirty="0" smtClean="0"/>
-              <a:t>means, summaries (</a:t>
-            </a:r>
-            <a:r>
-              <a:rPr lang="en-NZ" dirty="0" err="1" smtClean="0"/>
-              <a:t>ie</a:t>
-            </a:r>
-            <a:r>
-              <a:rPr lang="en-NZ" dirty="0" smtClean="0"/>
-              <a:t>: the R summary function), </a:t>
-            </a:r>
-            <a:r>
-              <a:rPr lang="en-NZ" dirty="0" err="1" smtClean="0"/>
-              <a:t>quantiles</a:t>
-            </a:r>
-            <a:endParaRPr lang="en-NZ" dirty="0"/>
-          </a:p>
-        </p:txBody>
-      </p:sp>
-    </p:spTree>
-    <p:extLst>
-      <p:ext uri="{BB962C8B-B14F-4D97-AF65-F5344CB8AC3E}">
-        <p14:creationId xmlns:p14="http://schemas.microsoft.com/office/powerpoint/2010/main" val="4144433867"/>
-      </p:ext>
-    </p:extLst>
-  </p:cSld>
-  <p:clrMapOvr>
-    <a:masterClrMapping/>
-  </p:clrMapOvr>
-</p:sld>
-</file>
-
 <file path=ppt/slides/slide25.xml><?xml version="1.0" encoding="utf-8"?>
 <p:sld xmlns:a="http://schemas.openxmlformats.org/drawingml/2006/main" xmlns:r="http://schemas.openxmlformats.org/officeDocument/2006/relationships" xmlns:p="http://schemas.openxmlformats.org/presentationml/2006/main">
   <p:cSld>
@@ -15771,6 +16177,207 @@
           <a:p>
             <a:r>
               <a:rPr lang="en-NZ" dirty="0" err="1" smtClean="0"/>
+              <a:t>appendRunStats</a:t>
+            </a:r>
+            <a:endParaRPr lang="en-NZ" dirty="0"/>
+          </a:p>
+        </p:txBody>
+      </p:sp>
+      <p:sp>
+        <p:nvSpPr>
+          <p:cNvPr id="3" name="Content Placeholder 2"/>
+          <p:cNvSpPr>
+            <a:spLocks noGrp="1"/>
+          </p:cNvSpPr>
+          <p:nvPr>
+            <p:ph idx="1"/>
+          </p:nvPr>
+        </p:nvSpPr>
+        <p:spPr/>
+        <p:txBody>
+          <a:bodyPr>
+            <a:normAutofit fontScale="70000" lnSpcReduction="20000"/>
+          </a:bodyPr>
+          <a:lstStyle/>
+          <a:p>
+            <a:r>
+              <a:rPr lang="en-NZ" dirty="0"/>
+              <a:t>At the end of each run a set of run stats is calculated for </a:t>
+            </a:r>
+            <a:r>
+              <a:rPr lang="en-NZ" dirty="0" smtClean="0"/>
+              <a:t>outcomes</a:t>
+            </a:r>
+          </a:p>
+          <a:p>
+            <a:r>
+              <a:rPr lang="en-NZ" dirty="0" smtClean="0"/>
+              <a:t>A run stat is any value from any outcome that you wish record and track across multiple runs</a:t>
+            </a:r>
+          </a:p>
+          <a:p>
+            <a:r>
+              <a:rPr lang="en-NZ" dirty="0" smtClean="0"/>
+              <a:t>Typically a run stat is an aggregate value calculated across each iteration (</a:t>
+            </a:r>
+            <a:r>
+              <a:rPr lang="en-NZ" dirty="0" err="1" smtClean="0"/>
+              <a:t>eg</a:t>
+            </a:r>
+            <a:r>
+              <a:rPr lang="en-NZ" dirty="0" smtClean="0"/>
+              <a:t>: a mean for </a:t>
+            </a:r>
+            <a:r>
+              <a:rPr lang="en-NZ" smtClean="0"/>
+              <a:t>each iteration) </a:t>
+            </a:r>
+            <a:r>
+              <a:rPr lang="en-NZ" dirty="0" smtClean="0"/>
+              <a:t>although it could be a result from a specific iteration</a:t>
+            </a:r>
+          </a:p>
+          <a:p>
+            <a:r>
+              <a:rPr lang="en-NZ" dirty="0" smtClean="0"/>
+              <a:t>Example of run stats include:</a:t>
+            </a:r>
+          </a:p>
+          <a:p>
+            <a:pPr lvl="1"/>
+            <a:r>
+              <a:rPr lang="en-NZ" dirty="0" smtClean="0"/>
+              <a:t>a </a:t>
+            </a:r>
+            <a:r>
+              <a:rPr lang="en-NZ" dirty="0"/>
+              <a:t>single </a:t>
+            </a:r>
+            <a:r>
+              <a:rPr lang="en-NZ" dirty="0" smtClean="0"/>
+              <a:t>value, e.g. mean</a:t>
+            </a:r>
+          </a:p>
+          <a:p>
+            <a:pPr lvl="1"/>
+            <a:r>
+              <a:rPr lang="en-NZ" dirty="0" smtClean="0"/>
+              <a:t>a vector, e.g. </a:t>
+            </a:r>
+            <a:r>
+              <a:rPr lang="en-NZ" dirty="0"/>
+              <a:t>frequencies, </a:t>
+            </a:r>
+            <a:r>
+              <a:rPr lang="en-NZ" dirty="0" err="1"/>
+              <a:t>quantiles</a:t>
+            </a:r>
+            <a:r>
+              <a:rPr lang="en-NZ" dirty="0"/>
+              <a:t>, </a:t>
+            </a:r>
+            <a:r>
+              <a:rPr lang="en-NZ" dirty="0" smtClean="0"/>
+              <a:t>summary</a:t>
+            </a:r>
+          </a:p>
+          <a:p>
+            <a:pPr lvl="1"/>
+            <a:r>
+              <a:rPr lang="en-NZ" dirty="0" smtClean="0"/>
+              <a:t>a matrix, e.g. </a:t>
+            </a:r>
+            <a:r>
+              <a:rPr lang="en-NZ" dirty="0"/>
+              <a:t>2 way </a:t>
+            </a:r>
+            <a:r>
+              <a:rPr lang="en-NZ" dirty="0" smtClean="0"/>
+              <a:t>table</a:t>
+            </a:r>
+          </a:p>
+          <a:p>
+            <a:r>
+              <a:rPr lang="en-NZ" dirty="0" smtClean="0"/>
+              <a:t>Run stat functions are available to produce</a:t>
+            </a:r>
+          </a:p>
+          <a:p>
+            <a:pPr lvl="1"/>
+            <a:r>
+              <a:rPr lang="en-NZ" dirty="0" smtClean="0"/>
+              <a:t>frequency tables (for both categorical and continuous variables)</a:t>
+            </a:r>
+          </a:p>
+          <a:p>
+            <a:pPr lvl="1"/>
+            <a:r>
+              <a:rPr lang="en-NZ" dirty="0" smtClean="0"/>
+              <a:t>means, summaries (</a:t>
+            </a:r>
+            <a:r>
+              <a:rPr lang="en-NZ" dirty="0" err="1" smtClean="0"/>
+              <a:t>ie</a:t>
+            </a:r>
+            <a:r>
+              <a:rPr lang="en-NZ" dirty="0" smtClean="0"/>
+              <a:t>: the R summary function), </a:t>
+            </a:r>
+            <a:r>
+              <a:rPr lang="en-NZ" dirty="0" err="1" smtClean="0"/>
+              <a:t>quantiles</a:t>
+            </a:r>
+            <a:endParaRPr lang="en-NZ" dirty="0"/>
+          </a:p>
+        </p:txBody>
+      </p:sp>
+    </p:spTree>
+    <p:extLst>
+      <p:ext uri="{BB962C8B-B14F-4D97-AF65-F5344CB8AC3E}">
+        <p14:creationId xmlns:p14="http://schemas.microsoft.com/office/powerpoint/2010/main" val="4144433867"/>
+      </p:ext>
+    </p:extLst>
+  </p:cSld>
+  <p:clrMapOvr>
+    <a:masterClrMapping/>
+  </p:clrMapOvr>
+</p:sld>
+</file>
+
+<file path=ppt/slides/slide26.xml><?xml version="1.0" encoding="utf-8"?>
+<p:sld xmlns:a="http://schemas.openxmlformats.org/drawingml/2006/main" xmlns:r="http://schemas.openxmlformats.org/officeDocument/2006/relationships" xmlns:p="http://schemas.openxmlformats.org/presentationml/2006/main">
+  <p:cSld>
+    <p:spTree>
+      <p:nvGrpSpPr>
+        <p:cNvPr id="1" name=""/>
+        <p:cNvGrpSpPr/>
+        <p:nvPr/>
+      </p:nvGrpSpPr>
+      <p:grpSpPr>
+        <a:xfrm>
+          <a:off x="0" y="0"/>
+          <a:ext cx="0" cy="0"/>
+          <a:chOff x="0" y="0"/>
+          <a:chExt cx="0" cy="0"/>
+        </a:xfrm>
+      </p:grpSpPr>
+      <p:sp>
+        <p:nvSpPr>
+          <p:cNvPr id="2" name="Title 1"/>
+          <p:cNvSpPr>
+            <a:spLocks noGrp="1"/>
+          </p:cNvSpPr>
+          <p:nvPr>
+            <p:ph type="title"/>
+          </p:nvPr>
+        </p:nvSpPr>
+        <p:spPr/>
+        <p:txBody>
+          <a:bodyPr/>
+          <a:lstStyle/>
+          <a:p>
+            <a:r>
+              <a:rPr lang="en-NZ" dirty="0" err="1" smtClean="0"/>
               <a:t>collateRunStats</a:t>
             </a:r>
             <a:endParaRPr lang="en-NZ" dirty="0"/>
@@ -15846,7 +16453,7 @@
 </p:sld>
 </file>
 
-<file path=ppt/slides/slide26.xml><?xml version="1.0" encoding="utf-8"?>
+<file path=ppt/slides/slide27.xml><?xml version="1.0" encoding="utf-8"?>
 <p:sld xmlns:a="http://schemas.openxmlformats.org/drawingml/2006/main" xmlns:r="http://schemas.openxmlformats.org/officeDocument/2006/relationships" xmlns:p="http://schemas.openxmlformats.org/presentationml/2006/main">
   <p:cSld>
     <p:spTree>
@@ -15928,7 +16535,7 @@
 </p:sld>
 </file>
 
-<file path=ppt/slides/slide27.xml><?xml version="1.0" encoding="utf-8"?>
+<file path=ppt/slides/slide28.xml><?xml version="1.0" encoding="utf-8"?>
 <p:sld xmlns:a="http://schemas.openxmlformats.org/drawingml/2006/main" xmlns:r="http://schemas.openxmlformats.org/officeDocument/2006/relationships" xmlns:p="http://schemas.openxmlformats.org/presentationml/2006/main">
   <p:cSld>
     <p:spTree>
@@ -16010,7 +16617,7 @@
 </p:sld>
 </file>
 
-<file path=ppt/slides/slide28.xml><?xml version="1.0" encoding="utf-8"?>
+<file path=ppt/slides/slide29.xml><?xml version="1.0" encoding="utf-8"?>
 <p:sld xmlns:a="http://schemas.openxmlformats.org/drawingml/2006/main" xmlns:r="http://schemas.openxmlformats.org/officeDocument/2006/relationships" xmlns:p="http://schemas.openxmlformats.org/presentationml/2006/main">
   <p:cSld>
     <p:spTree>
@@ -16173,11 +16780,7 @@
             </a:r>
             <a:r>
               <a:rPr lang="en-NZ" dirty="0" smtClean="0"/>
-              <a:t> </a:t>
-            </a:r>
-            <a:r>
-              <a:rPr lang="en-NZ" dirty="0" smtClean="0"/>
-              <a:t>features</a:t>
+              <a:t> features</a:t>
             </a:r>
             <a:endParaRPr lang="en-NZ" dirty="0"/>
           </a:p>
@@ -17331,7 +17934,12 @@
             <p:ph idx="1"/>
           </p:nvPr>
         </p:nvSpPr>
-        <p:spPr/>
+        <p:spPr>
+          <a:xfrm>
+            <a:off x="457200" y="1600201"/>
+            <a:ext cx="8363272" cy="5213175"/>
+          </a:xfrm>
+        </p:spPr>
         <p:txBody>
           <a:bodyPr>
             <a:normAutofit/>
@@ -17340,7 +17948,7 @@
           <a:p>
             <a:r>
               <a:rPr lang="en-NZ" dirty="0" smtClean="0"/>
-              <a:t>Before or during the simulation the user may wish to specify the proportion of category values desired for a </a:t>
+              <a:t>The user may wish to specify the proportion of category values desired for a </a:t>
             </a:r>
             <a:r>
               <a:rPr lang="en-NZ" dirty="0" err="1" smtClean="0"/>
@@ -17348,7 +17956,7 @@
             </a:r>
             <a:r>
               <a:rPr lang="en-NZ" dirty="0" smtClean="0"/>
-              <a:t> variable</a:t>
+              <a:t> variable – pre-simulation and/or for specific iterations</a:t>
             </a:r>
           </a:p>
           <a:p>

</xml_diff>